<commit_message>
Add graph & fix:from review
</commit_message>
<xml_diff>
--- a/src/figures/graph-pagesize.pptx
+++ b/src/figures/graph-pagesize.pptx
@@ -2,7 +2,7 @@
 <file path=ppt/presentation.xml><?xml version="1.0" encoding="utf-8"?>
 <p:presentation xmlns:a="http://schemas.openxmlformats.org/drawingml/2006/main" xmlns:r="http://schemas.openxmlformats.org/officeDocument/2006/relationships" xmlns:p="http://schemas.openxmlformats.org/presentationml/2006/main" saveSubsetFonts="1">
   <p:sldMasterIdLst>
-    <p:sldMasterId id="2147483768" r:id="rId1"/>
+    <p:sldMasterId id="2147483780" r:id="rId1"/>
   </p:sldMasterIdLst>
   <p:sldIdLst>
     <p:sldId id="256" r:id="rId2"/>
@@ -10,7 +10,7 @@
     <p:sldId id="258" r:id="rId4"/>
     <p:sldId id="259" r:id="rId5"/>
   </p:sldIdLst>
-  <p:sldSz cx="5400675" cy="1979613"/>
+  <p:sldSz cx="5400675" cy="2160588"/>
   <p:notesSz cx="6858000" cy="9144000"/>
   <p:defaultTextStyle>
     <a:defPPr>
@@ -2044,7 +2044,7 @@
               <c:strCache>
                 <c:ptCount val="1"/>
                 <c:pt idx="0">
-                  <c:v>UART</c:v>
+                  <c:v>uart</c:v>
                 </c:pt>
               </c:strCache>
             </c:strRef>
@@ -2135,7 +2135,7 @@
               <c:strCache>
                 <c:ptCount val="1"/>
                 <c:pt idx="0">
-                  <c:v>UART(改良後)</c:v>
+                  <c:v>uart（改善後）</c:v>
                 </c:pt>
               </c:strCache>
             </c:strRef>
@@ -2280,7 +2280,7 @@
         <c:axId val="773771647"/>
         <c:scaling>
           <c:orientation val="minMax"/>
-          <c:min val="1"/>
+          <c:min val="0"/>
         </c:scaling>
         <c:delete val="0"/>
         <c:axPos val="l"/>
@@ -2461,7 +2461,7 @@
               <c:strCache>
                 <c:ptCount val="1"/>
                 <c:pt idx="0">
-                  <c:v>UART-bef</c:v>
+                  <c:v>uart</c:v>
                 </c:pt>
               </c:strCache>
             </c:strRef>
@@ -2552,7 +2552,7 @@
               <c:strCache>
                 <c:ptCount val="1"/>
                 <c:pt idx="0">
-                  <c:v>UART-af</c:v>
+                  <c:v>uart（改善後）</c:v>
                 </c:pt>
               </c:strCache>
             </c:strRef>
@@ -2697,7 +2697,7 @@
         <c:axId val="773771647"/>
         <c:scaling>
           <c:orientation val="minMax"/>
-          <c:min val="6"/>
+          <c:min val="0"/>
         </c:scaling>
         <c:delete val="0"/>
         <c:axPos val="l"/>
@@ -2767,7 +2767,7 @@
         <c:manualLayout>
           <c:xMode val="edge"/>
           <c:yMode val="edge"/>
-          <c:x val="3.4976875817560745E-3"/>
+          <c:x val="3.4977151524612942E-3"/>
           <c:y val="0"/>
           <c:w val="0.98316212452473162"/>
           <c:h val="8.6670350580009589E-2"/>
@@ -5648,15 +5648,15 @@
         </p:nvSpPr>
         <p:spPr>
           <a:xfrm>
-            <a:off x="675085" y="323978"/>
-            <a:ext cx="4050506" cy="689199"/>
+            <a:off x="675085" y="353596"/>
+            <a:ext cx="4050506" cy="752205"/>
           </a:xfrm>
         </p:spPr>
         <p:txBody>
           <a:bodyPr anchor="b"/>
           <a:lstStyle>
             <a:lvl1pPr algn="ctr">
-              <a:defRPr sz="1732"/>
+              <a:defRPr sz="1890"/>
             </a:lvl1pPr>
           </a:lstStyle>
           <a:p>
@@ -5680,8 +5680,8 @@
         </p:nvSpPr>
         <p:spPr>
           <a:xfrm>
-            <a:off x="675085" y="1039755"/>
-            <a:ext cx="4050506" cy="477948"/>
+            <a:off x="675085" y="1134809"/>
+            <a:ext cx="4050506" cy="521642"/>
           </a:xfrm>
         </p:spPr>
         <p:txBody>
@@ -5689,39 +5689,39 @@
           <a:lstStyle>
             <a:lvl1pPr marL="0" indent="0" algn="ctr">
               <a:buNone/>
-              <a:defRPr sz="693"/>
+              <a:defRPr sz="756"/>
             </a:lvl1pPr>
-            <a:lvl2pPr marL="131994" indent="0" algn="ctr">
+            <a:lvl2pPr marL="144018" indent="0" algn="ctr">
               <a:buNone/>
-              <a:defRPr sz="577"/>
+              <a:defRPr sz="630"/>
             </a:lvl2pPr>
-            <a:lvl3pPr marL="263987" indent="0" algn="ctr">
+            <a:lvl3pPr marL="288036" indent="0" algn="ctr">
               <a:buNone/>
-              <a:defRPr sz="520"/>
+              <a:defRPr sz="567"/>
             </a:lvl3pPr>
-            <a:lvl4pPr marL="395981" indent="0" algn="ctr">
+            <a:lvl4pPr marL="432054" indent="0" algn="ctr">
               <a:buNone/>
-              <a:defRPr sz="462"/>
+              <a:defRPr sz="504"/>
             </a:lvl4pPr>
-            <a:lvl5pPr marL="527975" indent="0" algn="ctr">
+            <a:lvl5pPr marL="576072" indent="0" algn="ctr">
               <a:buNone/>
-              <a:defRPr sz="462"/>
+              <a:defRPr sz="504"/>
             </a:lvl5pPr>
-            <a:lvl6pPr marL="659968" indent="0" algn="ctr">
+            <a:lvl6pPr marL="720090" indent="0" algn="ctr">
               <a:buNone/>
-              <a:defRPr sz="462"/>
+              <a:defRPr sz="504"/>
             </a:lvl6pPr>
-            <a:lvl7pPr marL="791962" indent="0" algn="ctr">
+            <a:lvl7pPr marL="864108" indent="0" algn="ctr">
               <a:buNone/>
-              <a:defRPr sz="462"/>
+              <a:defRPr sz="504"/>
             </a:lvl7pPr>
-            <a:lvl8pPr marL="923955" indent="0" algn="ctr">
+            <a:lvl8pPr marL="1008126" indent="0" algn="ctr">
               <a:buNone/>
-              <a:defRPr sz="462"/>
+              <a:defRPr sz="504"/>
             </a:lvl8pPr>
-            <a:lvl9pPr marL="1055949" indent="0" algn="ctr">
+            <a:lvl9pPr marL="1152144" indent="0" algn="ctr">
               <a:buNone/>
-              <a:defRPr sz="462"/>
+              <a:defRPr sz="504"/>
             </a:lvl9pPr>
           </a:lstStyle>
           <a:p>
@@ -5750,7 +5750,7 @@
           <a:p>
             <a:fld id="{084FC26D-2879-44C1-A7E8-03443A36CBFD}" type="datetimeFigureOut">
               <a:rPr kumimoji="1" lang="ja-JP" altLang="en-US" smtClean="0"/>
-              <a:t>2024/2/7</a:t>
+              <a:t>2024/2/11</a:t>
             </a:fld>
             <a:endParaRPr kumimoji="1" lang="ja-JP" altLang="en-US"/>
           </a:p>
@@ -5801,7 +5801,7 @@
     </p:spTree>
     <p:extLst>
       <p:ext uri="{BB962C8B-B14F-4D97-AF65-F5344CB8AC3E}">
-        <p14:creationId xmlns:p14="http://schemas.microsoft.com/office/powerpoint/2010/main" val="3438568567"/>
+        <p14:creationId xmlns:p14="http://schemas.microsoft.com/office/powerpoint/2010/main" val="326527266"/>
       </p:ext>
     </p:extLst>
   </p:cSld>
@@ -5952,7 +5952,7 @@
           <a:p>
             <a:fld id="{084FC26D-2879-44C1-A7E8-03443A36CBFD}" type="datetimeFigureOut">
               <a:rPr kumimoji="1" lang="ja-JP" altLang="en-US" smtClean="0"/>
-              <a:t>2024/2/7</a:t>
+              <a:t>2024/2/11</a:t>
             </a:fld>
             <a:endParaRPr kumimoji="1" lang="ja-JP" altLang="en-US"/>
           </a:p>
@@ -6003,7 +6003,7 @@
     </p:spTree>
     <p:extLst>
       <p:ext uri="{BB962C8B-B14F-4D97-AF65-F5344CB8AC3E}">
-        <p14:creationId xmlns:p14="http://schemas.microsoft.com/office/powerpoint/2010/main" val="3505001622"/>
+        <p14:creationId xmlns:p14="http://schemas.microsoft.com/office/powerpoint/2010/main" val="1407530567"/>
       </p:ext>
     </p:extLst>
   </p:cSld>
@@ -6042,8 +6042,8 @@
         </p:nvSpPr>
         <p:spPr>
           <a:xfrm>
-            <a:off x="3864858" y="105396"/>
-            <a:ext cx="1164521" cy="1677631"/>
+            <a:off x="3864858" y="115032"/>
+            <a:ext cx="1164521" cy="1830998"/>
           </a:xfrm>
         </p:spPr>
         <p:txBody>
@@ -6070,8 +6070,8 @@
         </p:nvSpPr>
         <p:spPr>
           <a:xfrm>
-            <a:off x="371297" y="105396"/>
-            <a:ext cx="3426053" cy="1677631"/>
+            <a:off x="371297" y="115032"/>
+            <a:ext cx="3426053" cy="1830998"/>
           </a:xfrm>
         </p:spPr>
         <p:txBody>
@@ -6164,7 +6164,7 @@
           <a:p>
             <a:fld id="{084FC26D-2879-44C1-A7E8-03443A36CBFD}" type="datetimeFigureOut">
               <a:rPr kumimoji="1" lang="ja-JP" altLang="en-US" smtClean="0"/>
-              <a:t>2024/2/7</a:t>
+              <a:t>2024/2/11</a:t>
             </a:fld>
             <a:endParaRPr kumimoji="1" lang="ja-JP" altLang="en-US"/>
           </a:p>
@@ -6215,7 +6215,7 @@
     </p:spTree>
     <p:extLst>
       <p:ext uri="{BB962C8B-B14F-4D97-AF65-F5344CB8AC3E}">
-        <p14:creationId xmlns:p14="http://schemas.microsoft.com/office/powerpoint/2010/main" val="4223755934"/>
+        <p14:creationId xmlns:p14="http://schemas.microsoft.com/office/powerpoint/2010/main" val="4019591043"/>
       </p:ext>
     </p:extLst>
   </p:cSld>
@@ -6366,7 +6366,7 @@
           <a:p>
             <a:fld id="{084FC26D-2879-44C1-A7E8-03443A36CBFD}" type="datetimeFigureOut">
               <a:rPr kumimoji="1" lang="ja-JP" altLang="en-US" smtClean="0"/>
-              <a:t>2024/2/7</a:t>
+              <a:t>2024/2/11</a:t>
             </a:fld>
             <a:endParaRPr kumimoji="1" lang="ja-JP" altLang="en-US"/>
           </a:p>
@@ -6417,7 +6417,7 @@
     </p:spTree>
     <p:extLst>
       <p:ext uri="{BB962C8B-B14F-4D97-AF65-F5344CB8AC3E}">
-        <p14:creationId xmlns:p14="http://schemas.microsoft.com/office/powerpoint/2010/main" val="4287391207"/>
+        <p14:creationId xmlns:p14="http://schemas.microsoft.com/office/powerpoint/2010/main" val="1872360119"/>
       </p:ext>
     </p:extLst>
   </p:cSld>
@@ -6456,15 +6456,15 @@
         </p:nvSpPr>
         <p:spPr>
           <a:xfrm>
-            <a:off x="368484" y="493529"/>
-            <a:ext cx="4658082" cy="823464"/>
+            <a:off x="368484" y="538647"/>
+            <a:ext cx="4658082" cy="898744"/>
           </a:xfrm>
         </p:spPr>
         <p:txBody>
           <a:bodyPr anchor="b"/>
           <a:lstStyle>
             <a:lvl1pPr>
-              <a:defRPr sz="1732"/>
+              <a:defRPr sz="1890"/>
             </a:lvl1pPr>
           </a:lstStyle>
           <a:p>
@@ -6488,8 +6488,8 @@
         </p:nvSpPr>
         <p:spPr>
           <a:xfrm>
-            <a:off x="368484" y="1324783"/>
-            <a:ext cx="4658082" cy="433040"/>
+            <a:off x="368484" y="1445894"/>
+            <a:ext cx="4658082" cy="472628"/>
           </a:xfrm>
         </p:spPr>
         <p:txBody>
@@ -6497,7 +6497,7 @@
           <a:lstStyle>
             <a:lvl1pPr marL="0" indent="0">
               <a:buNone/>
-              <a:defRPr sz="693">
+              <a:defRPr sz="756">
                 <a:solidFill>
                   <a:schemeClr val="tx1">
                     <a:tint val="75000"/>
@@ -6505,9 +6505,9 @@
                 </a:solidFill>
               </a:defRPr>
             </a:lvl1pPr>
-            <a:lvl2pPr marL="131994" indent="0">
+            <a:lvl2pPr marL="144018" indent="0">
               <a:buNone/>
-              <a:defRPr sz="577">
+              <a:defRPr sz="630">
                 <a:solidFill>
                   <a:schemeClr val="tx1">
                     <a:tint val="75000"/>
@@ -6515,9 +6515,9 @@
                 </a:solidFill>
               </a:defRPr>
             </a:lvl2pPr>
-            <a:lvl3pPr marL="263987" indent="0">
+            <a:lvl3pPr marL="288036" indent="0">
               <a:buNone/>
-              <a:defRPr sz="520">
+              <a:defRPr sz="567">
                 <a:solidFill>
                   <a:schemeClr val="tx1">
                     <a:tint val="75000"/>
@@ -6525,9 +6525,9 @@
                 </a:solidFill>
               </a:defRPr>
             </a:lvl3pPr>
-            <a:lvl4pPr marL="395981" indent="0">
+            <a:lvl4pPr marL="432054" indent="0">
               <a:buNone/>
-              <a:defRPr sz="462">
+              <a:defRPr sz="504">
                 <a:solidFill>
                   <a:schemeClr val="tx1">
                     <a:tint val="75000"/>
@@ -6535,9 +6535,9 @@
                 </a:solidFill>
               </a:defRPr>
             </a:lvl4pPr>
-            <a:lvl5pPr marL="527975" indent="0">
+            <a:lvl5pPr marL="576072" indent="0">
               <a:buNone/>
-              <a:defRPr sz="462">
+              <a:defRPr sz="504">
                 <a:solidFill>
                   <a:schemeClr val="tx1">
                     <a:tint val="75000"/>
@@ -6545,9 +6545,9 @@
                 </a:solidFill>
               </a:defRPr>
             </a:lvl5pPr>
-            <a:lvl6pPr marL="659968" indent="0">
+            <a:lvl6pPr marL="720090" indent="0">
               <a:buNone/>
-              <a:defRPr sz="462">
+              <a:defRPr sz="504">
                 <a:solidFill>
                   <a:schemeClr val="tx1">
                     <a:tint val="75000"/>
@@ -6555,9 +6555,9 @@
                 </a:solidFill>
               </a:defRPr>
             </a:lvl6pPr>
-            <a:lvl7pPr marL="791962" indent="0">
+            <a:lvl7pPr marL="864108" indent="0">
               <a:buNone/>
-              <a:defRPr sz="462">
+              <a:defRPr sz="504">
                 <a:solidFill>
                   <a:schemeClr val="tx1">
                     <a:tint val="75000"/>
@@ -6565,9 +6565,9 @@
                 </a:solidFill>
               </a:defRPr>
             </a:lvl7pPr>
-            <a:lvl8pPr marL="923955" indent="0">
+            <a:lvl8pPr marL="1008126" indent="0">
               <a:buNone/>
-              <a:defRPr sz="462">
+              <a:defRPr sz="504">
                 <a:solidFill>
                   <a:schemeClr val="tx1">
                     <a:tint val="75000"/>
@@ -6575,9 +6575,9 @@
                 </a:solidFill>
               </a:defRPr>
             </a:lvl8pPr>
-            <a:lvl9pPr marL="1055949" indent="0">
+            <a:lvl9pPr marL="1152144" indent="0">
               <a:buNone/>
-              <a:defRPr sz="462">
+              <a:defRPr sz="504">
                 <a:solidFill>
                   <a:schemeClr val="tx1">
                     <a:tint val="75000"/>
@@ -6612,7 +6612,7 @@
           <a:p>
             <a:fld id="{084FC26D-2879-44C1-A7E8-03443A36CBFD}" type="datetimeFigureOut">
               <a:rPr kumimoji="1" lang="ja-JP" altLang="en-US" smtClean="0"/>
-              <a:t>2024/2/7</a:t>
+              <a:t>2024/2/11</a:t>
             </a:fld>
             <a:endParaRPr kumimoji="1" lang="ja-JP" altLang="en-US"/>
           </a:p>
@@ -6663,7 +6663,7 @@
     </p:spTree>
     <p:extLst>
       <p:ext uri="{BB962C8B-B14F-4D97-AF65-F5344CB8AC3E}">
-        <p14:creationId xmlns:p14="http://schemas.microsoft.com/office/powerpoint/2010/main" val="122338378"/>
+        <p14:creationId xmlns:p14="http://schemas.microsoft.com/office/powerpoint/2010/main" val="2053817447"/>
       </p:ext>
     </p:extLst>
   </p:cSld>
@@ -6725,8 +6725,8 @@
         </p:nvSpPr>
         <p:spPr>
           <a:xfrm>
-            <a:off x="371296" y="526980"/>
-            <a:ext cx="2295287" cy="1256046"/>
+            <a:off x="371296" y="575157"/>
+            <a:ext cx="2295287" cy="1370873"/>
           </a:xfrm>
         </p:spPr>
         <p:txBody>
@@ -6814,8 +6814,8 @@
         </p:nvSpPr>
         <p:spPr>
           <a:xfrm>
-            <a:off x="2734092" y="526980"/>
-            <a:ext cx="2295287" cy="1256046"/>
+            <a:off x="2734092" y="575157"/>
+            <a:ext cx="2295287" cy="1370873"/>
           </a:xfrm>
         </p:spPr>
         <p:txBody>
@@ -6908,7 +6908,7 @@
           <a:p>
             <a:fld id="{084FC26D-2879-44C1-A7E8-03443A36CBFD}" type="datetimeFigureOut">
               <a:rPr kumimoji="1" lang="ja-JP" altLang="en-US" smtClean="0"/>
-              <a:t>2024/2/7</a:t>
+              <a:t>2024/2/11</a:t>
             </a:fld>
             <a:endParaRPr kumimoji="1" lang="ja-JP" altLang="en-US"/>
           </a:p>
@@ -6959,7 +6959,7 @@
     </p:spTree>
     <p:extLst>
       <p:ext uri="{BB962C8B-B14F-4D97-AF65-F5344CB8AC3E}">
-        <p14:creationId xmlns:p14="http://schemas.microsoft.com/office/powerpoint/2010/main" val="254392013"/>
+        <p14:creationId xmlns:p14="http://schemas.microsoft.com/office/powerpoint/2010/main" val="686602666"/>
       </p:ext>
     </p:extLst>
   </p:cSld>
@@ -6998,8 +6998,8 @@
         </p:nvSpPr>
         <p:spPr>
           <a:xfrm>
-            <a:off x="372000" y="105396"/>
-            <a:ext cx="4658082" cy="382634"/>
+            <a:off x="372000" y="115031"/>
+            <a:ext cx="4658082" cy="417614"/>
           </a:xfrm>
         </p:spPr>
         <p:txBody>
@@ -7026,8 +7026,8 @@
         </p:nvSpPr>
         <p:spPr>
           <a:xfrm>
-            <a:off x="372000" y="485280"/>
-            <a:ext cx="2284738" cy="237828"/>
+            <a:off x="372000" y="529645"/>
+            <a:ext cx="2284738" cy="259570"/>
           </a:xfrm>
         </p:spPr>
         <p:txBody>
@@ -7035,39 +7035,39 @@
           <a:lstStyle>
             <a:lvl1pPr marL="0" indent="0">
               <a:buNone/>
-              <a:defRPr sz="693" b="1"/>
+              <a:defRPr sz="756" b="1"/>
             </a:lvl1pPr>
-            <a:lvl2pPr marL="131994" indent="0">
+            <a:lvl2pPr marL="144018" indent="0">
               <a:buNone/>
-              <a:defRPr sz="577" b="1"/>
+              <a:defRPr sz="630" b="1"/>
             </a:lvl2pPr>
-            <a:lvl3pPr marL="263987" indent="0">
+            <a:lvl3pPr marL="288036" indent="0">
               <a:buNone/>
-              <a:defRPr sz="520" b="1"/>
+              <a:defRPr sz="567" b="1"/>
             </a:lvl3pPr>
-            <a:lvl4pPr marL="395981" indent="0">
+            <a:lvl4pPr marL="432054" indent="0">
               <a:buNone/>
-              <a:defRPr sz="462" b="1"/>
+              <a:defRPr sz="504" b="1"/>
             </a:lvl4pPr>
-            <a:lvl5pPr marL="527975" indent="0">
+            <a:lvl5pPr marL="576072" indent="0">
               <a:buNone/>
-              <a:defRPr sz="462" b="1"/>
+              <a:defRPr sz="504" b="1"/>
             </a:lvl5pPr>
-            <a:lvl6pPr marL="659968" indent="0">
+            <a:lvl6pPr marL="720090" indent="0">
               <a:buNone/>
-              <a:defRPr sz="462" b="1"/>
+              <a:defRPr sz="504" b="1"/>
             </a:lvl6pPr>
-            <a:lvl7pPr marL="791962" indent="0">
+            <a:lvl7pPr marL="864108" indent="0">
               <a:buNone/>
-              <a:defRPr sz="462" b="1"/>
+              <a:defRPr sz="504" b="1"/>
             </a:lvl7pPr>
-            <a:lvl8pPr marL="923955" indent="0">
+            <a:lvl8pPr marL="1008126" indent="0">
               <a:buNone/>
-              <a:defRPr sz="462" b="1"/>
+              <a:defRPr sz="504" b="1"/>
             </a:lvl8pPr>
-            <a:lvl9pPr marL="1055949" indent="0">
+            <a:lvl9pPr marL="1152144" indent="0">
               <a:buNone/>
-              <a:defRPr sz="462" b="1"/>
+              <a:defRPr sz="504" b="1"/>
             </a:lvl9pPr>
           </a:lstStyle>
           <a:p>
@@ -7091,8 +7091,8 @@
         </p:nvSpPr>
         <p:spPr>
           <a:xfrm>
-            <a:off x="372000" y="723109"/>
-            <a:ext cx="2284738" cy="1063584"/>
+            <a:off x="372000" y="789215"/>
+            <a:ext cx="2284738" cy="1160816"/>
           </a:xfrm>
         </p:spPr>
         <p:txBody>
@@ -7180,8 +7180,8 @@
         </p:nvSpPr>
         <p:spPr>
           <a:xfrm>
-            <a:off x="2734092" y="485280"/>
-            <a:ext cx="2295990" cy="237828"/>
+            <a:off x="2734092" y="529645"/>
+            <a:ext cx="2295990" cy="259570"/>
           </a:xfrm>
         </p:spPr>
         <p:txBody>
@@ -7189,39 +7189,39 @@
           <a:lstStyle>
             <a:lvl1pPr marL="0" indent="0">
               <a:buNone/>
-              <a:defRPr sz="693" b="1"/>
+              <a:defRPr sz="756" b="1"/>
             </a:lvl1pPr>
-            <a:lvl2pPr marL="131994" indent="0">
+            <a:lvl2pPr marL="144018" indent="0">
               <a:buNone/>
-              <a:defRPr sz="577" b="1"/>
+              <a:defRPr sz="630" b="1"/>
             </a:lvl2pPr>
-            <a:lvl3pPr marL="263987" indent="0">
+            <a:lvl3pPr marL="288036" indent="0">
               <a:buNone/>
-              <a:defRPr sz="520" b="1"/>
+              <a:defRPr sz="567" b="1"/>
             </a:lvl3pPr>
-            <a:lvl4pPr marL="395981" indent="0">
+            <a:lvl4pPr marL="432054" indent="0">
               <a:buNone/>
-              <a:defRPr sz="462" b="1"/>
+              <a:defRPr sz="504" b="1"/>
             </a:lvl4pPr>
-            <a:lvl5pPr marL="527975" indent="0">
+            <a:lvl5pPr marL="576072" indent="0">
               <a:buNone/>
-              <a:defRPr sz="462" b="1"/>
+              <a:defRPr sz="504" b="1"/>
             </a:lvl5pPr>
-            <a:lvl6pPr marL="659968" indent="0">
+            <a:lvl6pPr marL="720090" indent="0">
               <a:buNone/>
-              <a:defRPr sz="462" b="1"/>
+              <a:defRPr sz="504" b="1"/>
             </a:lvl6pPr>
-            <a:lvl7pPr marL="791962" indent="0">
+            <a:lvl7pPr marL="864108" indent="0">
               <a:buNone/>
-              <a:defRPr sz="462" b="1"/>
+              <a:defRPr sz="504" b="1"/>
             </a:lvl7pPr>
-            <a:lvl8pPr marL="923955" indent="0">
+            <a:lvl8pPr marL="1008126" indent="0">
               <a:buNone/>
-              <a:defRPr sz="462" b="1"/>
+              <a:defRPr sz="504" b="1"/>
             </a:lvl8pPr>
-            <a:lvl9pPr marL="1055949" indent="0">
+            <a:lvl9pPr marL="1152144" indent="0">
               <a:buNone/>
-              <a:defRPr sz="462" b="1"/>
+              <a:defRPr sz="504" b="1"/>
             </a:lvl9pPr>
           </a:lstStyle>
           <a:p>
@@ -7245,8 +7245,8 @@
         </p:nvSpPr>
         <p:spPr>
           <a:xfrm>
-            <a:off x="2734092" y="723109"/>
-            <a:ext cx="2295990" cy="1063584"/>
+            <a:off x="2734092" y="789215"/>
+            <a:ext cx="2295990" cy="1160816"/>
           </a:xfrm>
         </p:spPr>
         <p:txBody>
@@ -7339,7 +7339,7 @@
           <a:p>
             <a:fld id="{084FC26D-2879-44C1-A7E8-03443A36CBFD}" type="datetimeFigureOut">
               <a:rPr kumimoji="1" lang="ja-JP" altLang="en-US" smtClean="0"/>
-              <a:t>2024/2/7</a:t>
+              <a:t>2024/2/11</a:t>
             </a:fld>
             <a:endParaRPr kumimoji="1" lang="ja-JP" altLang="en-US"/>
           </a:p>
@@ -7390,7 +7390,7 @@
     </p:spTree>
     <p:extLst>
       <p:ext uri="{BB962C8B-B14F-4D97-AF65-F5344CB8AC3E}">
-        <p14:creationId xmlns:p14="http://schemas.microsoft.com/office/powerpoint/2010/main" val="1051550044"/>
+        <p14:creationId xmlns:p14="http://schemas.microsoft.com/office/powerpoint/2010/main" val="2098824437"/>
       </p:ext>
     </p:extLst>
   </p:cSld>
@@ -7457,7 +7457,7 @@
           <a:p>
             <a:fld id="{084FC26D-2879-44C1-A7E8-03443A36CBFD}" type="datetimeFigureOut">
               <a:rPr kumimoji="1" lang="ja-JP" altLang="en-US" smtClean="0"/>
-              <a:t>2024/2/7</a:t>
+              <a:t>2024/2/11</a:t>
             </a:fld>
             <a:endParaRPr kumimoji="1" lang="ja-JP" altLang="en-US"/>
           </a:p>
@@ -7508,7 +7508,7 @@
     </p:spTree>
     <p:extLst>
       <p:ext uri="{BB962C8B-B14F-4D97-AF65-F5344CB8AC3E}">
-        <p14:creationId xmlns:p14="http://schemas.microsoft.com/office/powerpoint/2010/main" val="1956066351"/>
+        <p14:creationId xmlns:p14="http://schemas.microsoft.com/office/powerpoint/2010/main" val="254926418"/>
       </p:ext>
     </p:extLst>
   </p:cSld>
@@ -7552,7 +7552,7 @@
           <a:p>
             <a:fld id="{084FC26D-2879-44C1-A7E8-03443A36CBFD}" type="datetimeFigureOut">
               <a:rPr kumimoji="1" lang="ja-JP" altLang="en-US" smtClean="0"/>
-              <a:t>2024/2/7</a:t>
+              <a:t>2024/2/11</a:t>
             </a:fld>
             <a:endParaRPr kumimoji="1" lang="ja-JP" altLang="en-US"/>
           </a:p>
@@ -7603,7 +7603,7 @@
     </p:spTree>
     <p:extLst>
       <p:ext uri="{BB962C8B-B14F-4D97-AF65-F5344CB8AC3E}">
-        <p14:creationId xmlns:p14="http://schemas.microsoft.com/office/powerpoint/2010/main" val="1897321409"/>
+        <p14:creationId xmlns:p14="http://schemas.microsoft.com/office/powerpoint/2010/main" val="2033931617"/>
       </p:ext>
     </p:extLst>
   </p:cSld>
@@ -7613,7 +7613,7 @@
   <p:extLst>
     <p:ext uri="{DCECCB84-F9BA-43D5-87BE-67443E8EF086}">
       <p15:sldGuideLst xmlns:p15="http://schemas.microsoft.com/office/powerpoint/2012/main">
-        <p15:guide id="1" orient="horz" pos="623" userDrawn="1">
+        <p15:guide id="1" orient="horz" pos="680" userDrawn="1">
           <p15:clr>
             <a:srgbClr val="FBAE40"/>
           </p15:clr>
@@ -7658,15 +7658,15 @@
         </p:nvSpPr>
         <p:spPr>
           <a:xfrm>
-            <a:off x="372000" y="131974"/>
-            <a:ext cx="1741858" cy="461910"/>
+            <a:off x="372000" y="144039"/>
+            <a:ext cx="1741858" cy="504137"/>
           </a:xfrm>
         </p:spPr>
         <p:txBody>
           <a:bodyPr anchor="b"/>
           <a:lstStyle>
             <a:lvl1pPr>
-              <a:defRPr sz="924"/>
+              <a:defRPr sz="1008"/>
             </a:lvl1pPr>
           </a:lstStyle>
           <a:p>
@@ -7690,39 +7690,39 @@
         </p:nvSpPr>
         <p:spPr>
           <a:xfrm>
-            <a:off x="2295990" y="285028"/>
-            <a:ext cx="2734092" cy="1406808"/>
+            <a:off x="2295990" y="311085"/>
+            <a:ext cx="2734092" cy="1535418"/>
           </a:xfrm>
         </p:spPr>
         <p:txBody>
           <a:bodyPr/>
           <a:lstStyle>
             <a:lvl1pPr>
-              <a:defRPr sz="924"/>
+              <a:defRPr sz="1008"/>
             </a:lvl1pPr>
             <a:lvl2pPr>
-              <a:defRPr sz="808"/>
+              <a:defRPr sz="882"/>
             </a:lvl2pPr>
             <a:lvl3pPr>
-              <a:defRPr sz="693"/>
+              <a:defRPr sz="756"/>
             </a:lvl3pPr>
             <a:lvl4pPr>
-              <a:defRPr sz="577"/>
+              <a:defRPr sz="630"/>
             </a:lvl4pPr>
             <a:lvl5pPr>
-              <a:defRPr sz="577"/>
+              <a:defRPr sz="630"/>
             </a:lvl5pPr>
             <a:lvl6pPr>
-              <a:defRPr sz="577"/>
+              <a:defRPr sz="630"/>
             </a:lvl6pPr>
             <a:lvl7pPr>
-              <a:defRPr sz="577"/>
+              <a:defRPr sz="630"/>
             </a:lvl7pPr>
             <a:lvl8pPr>
-              <a:defRPr sz="577"/>
+              <a:defRPr sz="630"/>
             </a:lvl8pPr>
             <a:lvl9pPr>
-              <a:defRPr sz="577"/>
+              <a:defRPr sz="630"/>
             </a:lvl9pPr>
           </a:lstStyle>
           <a:p>
@@ -7807,8 +7807,8 @@
         </p:nvSpPr>
         <p:spPr>
           <a:xfrm>
-            <a:off x="372000" y="593884"/>
-            <a:ext cx="1741858" cy="1100243"/>
+            <a:off x="372000" y="648176"/>
+            <a:ext cx="1741858" cy="1200827"/>
           </a:xfrm>
         </p:spPr>
         <p:txBody>
@@ -7816,39 +7816,39 @@
           <a:lstStyle>
             <a:lvl1pPr marL="0" indent="0">
               <a:buNone/>
-              <a:defRPr sz="462"/>
+              <a:defRPr sz="504"/>
             </a:lvl1pPr>
-            <a:lvl2pPr marL="131994" indent="0">
+            <a:lvl2pPr marL="144018" indent="0">
               <a:buNone/>
-              <a:defRPr sz="404"/>
+              <a:defRPr sz="441"/>
             </a:lvl2pPr>
-            <a:lvl3pPr marL="263987" indent="0">
+            <a:lvl3pPr marL="288036" indent="0">
               <a:buNone/>
-              <a:defRPr sz="346"/>
+              <a:defRPr sz="378"/>
             </a:lvl3pPr>
-            <a:lvl4pPr marL="395981" indent="0">
+            <a:lvl4pPr marL="432054" indent="0">
               <a:buNone/>
-              <a:defRPr sz="289"/>
+              <a:defRPr sz="315"/>
             </a:lvl4pPr>
-            <a:lvl5pPr marL="527975" indent="0">
+            <a:lvl5pPr marL="576072" indent="0">
               <a:buNone/>
-              <a:defRPr sz="289"/>
+              <a:defRPr sz="315"/>
             </a:lvl5pPr>
-            <a:lvl6pPr marL="659968" indent="0">
+            <a:lvl6pPr marL="720090" indent="0">
               <a:buNone/>
-              <a:defRPr sz="289"/>
+              <a:defRPr sz="315"/>
             </a:lvl6pPr>
-            <a:lvl7pPr marL="791962" indent="0">
+            <a:lvl7pPr marL="864108" indent="0">
               <a:buNone/>
-              <a:defRPr sz="289"/>
+              <a:defRPr sz="315"/>
             </a:lvl7pPr>
-            <a:lvl8pPr marL="923955" indent="0">
+            <a:lvl8pPr marL="1008126" indent="0">
               <a:buNone/>
-              <a:defRPr sz="289"/>
+              <a:defRPr sz="315"/>
             </a:lvl8pPr>
-            <a:lvl9pPr marL="1055949" indent="0">
+            <a:lvl9pPr marL="1152144" indent="0">
               <a:buNone/>
-              <a:defRPr sz="289"/>
+              <a:defRPr sz="315"/>
             </a:lvl9pPr>
           </a:lstStyle>
           <a:p>
@@ -7877,7 +7877,7 @@
           <a:p>
             <a:fld id="{084FC26D-2879-44C1-A7E8-03443A36CBFD}" type="datetimeFigureOut">
               <a:rPr kumimoji="1" lang="ja-JP" altLang="en-US" smtClean="0"/>
-              <a:t>2024/2/7</a:t>
+              <a:t>2024/2/11</a:t>
             </a:fld>
             <a:endParaRPr kumimoji="1" lang="ja-JP" altLang="en-US"/>
           </a:p>
@@ -7928,7 +7928,7 @@
     </p:spTree>
     <p:extLst>
       <p:ext uri="{BB962C8B-B14F-4D97-AF65-F5344CB8AC3E}">
-        <p14:creationId xmlns:p14="http://schemas.microsoft.com/office/powerpoint/2010/main" val="3216029032"/>
+        <p14:creationId xmlns:p14="http://schemas.microsoft.com/office/powerpoint/2010/main" val="1648674795"/>
       </p:ext>
     </p:extLst>
   </p:cSld>
@@ -7967,15 +7967,15 @@
         </p:nvSpPr>
         <p:spPr>
           <a:xfrm>
-            <a:off x="372000" y="131974"/>
-            <a:ext cx="1741858" cy="461910"/>
+            <a:off x="372000" y="144039"/>
+            <a:ext cx="1741858" cy="504137"/>
           </a:xfrm>
         </p:spPr>
         <p:txBody>
           <a:bodyPr anchor="b"/>
           <a:lstStyle>
             <a:lvl1pPr>
-              <a:defRPr sz="924"/>
+              <a:defRPr sz="1008"/>
             </a:lvl1pPr>
           </a:lstStyle>
           <a:p>
@@ -7999,8 +7999,8 @@
         </p:nvSpPr>
         <p:spPr>
           <a:xfrm>
-            <a:off x="2295990" y="285028"/>
-            <a:ext cx="2734092" cy="1406808"/>
+            <a:off x="2295990" y="311085"/>
+            <a:ext cx="2734092" cy="1535418"/>
           </a:xfrm>
         </p:spPr>
         <p:txBody>
@@ -8008,39 +8008,39 @@
           <a:lstStyle>
             <a:lvl1pPr marL="0" indent="0">
               <a:buNone/>
-              <a:defRPr sz="924"/>
+              <a:defRPr sz="1008"/>
             </a:lvl1pPr>
-            <a:lvl2pPr marL="131994" indent="0">
+            <a:lvl2pPr marL="144018" indent="0">
               <a:buNone/>
-              <a:defRPr sz="808"/>
+              <a:defRPr sz="882"/>
             </a:lvl2pPr>
-            <a:lvl3pPr marL="263987" indent="0">
+            <a:lvl3pPr marL="288036" indent="0">
               <a:buNone/>
-              <a:defRPr sz="693"/>
+              <a:defRPr sz="756"/>
             </a:lvl3pPr>
-            <a:lvl4pPr marL="395981" indent="0">
+            <a:lvl4pPr marL="432054" indent="0">
               <a:buNone/>
-              <a:defRPr sz="577"/>
+              <a:defRPr sz="630"/>
             </a:lvl4pPr>
-            <a:lvl5pPr marL="527975" indent="0">
+            <a:lvl5pPr marL="576072" indent="0">
               <a:buNone/>
-              <a:defRPr sz="577"/>
+              <a:defRPr sz="630"/>
             </a:lvl5pPr>
-            <a:lvl6pPr marL="659968" indent="0">
+            <a:lvl6pPr marL="720090" indent="0">
               <a:buNone/>
-              <a:defRPr sz="577"/>
+              <a:defRPr sz="630"/>
             </a:lvl6pPr>
-            <a:lvl7pPr marL="791962" indent="0">
+            <a:lvl7pPr marL="864108" indent="0">
               <a:buNone/>
-              <a:defRPr sz="577"/>
+              <a:defRPr sz="630"/>
             </a:lvl7pPr>
-            <a:lvl8pPr marL="923955" indent="0">
+            <a:lvl8pPr marL="1008126" indent="0">
               <a:buNone/>
-              <a:defRPr sz="577"/>
+              <a:defRPr sz="630"/>
             </a:lvl8pPr>
-            <a:lvl9pPr marL="1055949" indent="0">
+            <a:lvl9pPr marL="1152144" indent="0">
               <a:buNone/>
-              <a:defRPr sz="577"/>
+              <a:defRPr sz="630"/>
             </a:lvl9pPr>
           </a:lstStyle>
           <a:p>
@@ -8064,8 +8064,8 @@
         </p:nvSpPr>
         <p:spPr>
           <a:xfrm>
-            <a:off x="372000" y="593884"/>
-            <a:ext cx="1741858" cy="1100243"/>
+            <a:off x="372000" y="648176"/>
+            <a:ext cx="1741858" cy="1200827"/>
           </a:xfrm>
         </p:spPr>
         <p:txBody>
@@ -8073,39 +8073,39 @@
           <a:lstStyle>
             <a:lvl1pPr marL="0" indent="0">
               <a:buNone/>
-              <a:defRPr sz="462"/>
+              <a:defRPr sz="504"/>
             </a:lvl1pPr>
-            <a:lvl2pPr marL="131994" indent="0">
+            <a:lvl2pPr marL="144018" indent="0">
               <a:buNone/>
-              <a:defRPr sz="404"/>
+              <a:defRPr sz="441"/>
             </a:lvl2pPr>
-            <a:lvl3pPr marL="263987" indent="0">
+            <a:lvl3pPr marL="288036" indent="0">
               <a:buNone/>
-              <a:defRPr sz="346"/>
+              <a:defRPr sz="378"/>
             </a:lvl3pPr>
-            <a:lvl4pPr marL="395981" indent="0">
+            <a:lvl4pPr marL="432054" indent="0">
               <a:buNone/>
-              <a:defRPr sz="289"/>
+              <a:defRPr sz="315"/>
             </a:lvl4pPr>
-            <a:lvl5pPr marL="527975" indent="0">
+            <a:lvl5pPr marL="576072" indent="0">
               <a:buNone/>
-              <a:defRPr sz="289"/>
+              <a:defRPr sz="315"/>
             </a:lvl5pPr>
-            <a:lvl6pPr marL="659968" indent="0">
+            <a:lvl6pPr marL="720090" indent="0">
               <a:buNone/>
-              <a:defRPr sz="289"/>
+              <a:defRPr sz="315"/>
             </a:lvl6pPr>
-            <a:lvl7pPr marL="791962" indent="0">
+            <a:lvl7pPr marL="864108" indent="0">
               <a:buNone/>
-              <a:defRPr sz="289"/>
+              <a:defRPr sz="315"/>
             </a:lvl7pPr>
-            <a:lvl8pPr marL="923955" indent="0">
+            <a:lvl8pPr marL="1008126" indent="0">
               <a:buNone/>
-              <a:defRPr sz="289"/>
+              <a:defRPr sz="315"/>
             </a:lvl8pPr>
-            <a:lvl9pPr marL="1055949" indent="0">
+            <a:lvl9pPr marL="1152144" indent="0">
               <a:buNone/>
-              <a:defRPr sz="289"/>
+              <a:defRPr sz="315"/>
             </a:lvl9pPr>
           </a:lstStyle>
           <a:p>
@@ -8134,7 +8134,7 @@
           <a:p>
             <a:fld id="{084FC26D-2879-44C1-A7E8-03443A36CBFD}" type="datetimeFigureOut">
               <a:rPr kumimoji="1" lang="ja-JP" altLang="en-US" smtClean="0"/>
-              <a:t>2024/2/7</a:t>
+              <a:t>2024/2/11</a:t>
             </a:fld>
             <a:endParaRPr kumimoji="1" lang="ja-JP" altLang="en-US"/>
           </a:p>
@@ -8185,7 +8185,7 @@
     </p:spTree>
     <p:extLst>
       <p:ext uri="{BB962C8B-B14F-4D97-AF65-F5344CB8AC3E}">
-        <p14:creationId xmlns:p14="http://schemas.microsoft.com/office/powerpoint/2010/main" val="1863539859"/>
+        <p14:creationId xmlns:p14="http://schemas.microsoft.com/office/powerpoint/2010/main" val="2702946937"/>
       </p:ext>
     </p:extLst>
   </p:cSld>
@@ -8229,8 +8229,8 @@
         </p:nvSpPr>
         <p:spPr>
           <a:xfrm>
-            <a:off x="371297" y="105396"/>
-            <a:ext cx="4658082" cy="382634"/>
+            <a:off x="371297" y="115031"/>
+            <a:ext cx="4658082" cy="417614"/>
           </a:xfrm>
           <a:prstGeom prst="rect">
             <a:avLst/>
@@ -8262,8 +8262,8 @@
         </p:nvSpPr>
         <p:spPr>
           <a:xfrm>
-            <a:off x="371297" y="526980"/>
-            <a:ext cx="4658082" cy="1256046"/>
+            <a:off x="371297" y="575157"/>
+            <a:ext cx="4658082" cy="1370873"/>
           </a:xfrm>
           <a:prstGeom prst="rect">
             <a:avLst/>
@@ -8356,8 +8356,8 @@
         </p:nvSpPr>
         <p:spPr>
           <a:xfrm>
-            <a:off x="371296" y="1834808"/>
-            <a:ext cx="1215152" cy="105396"/>
+            <a:off x="371296" y="2002545"/>
+            <a:ext cx="1215152" cy="115031"/>
           </a:xfrm>
           <a:prstGeom prst="rect">
             <a:avLst/>
@@ -8367,7 +8367,7 @@
           <a:bodyPr vert="horz" lIns="91440" tIns="45720" rIns="91440" bIns="45720" rtlCol="0" anchor="ctr"/>
           <a:lstStyle>
             <a:lvl1pPr algn="l">
-              <a:defRPr sz="346">
+              <a:defRPr sz="378">
                 <a:solidFill>
                   <a:schemeClr val="tx1">
                     <a:tint val="75000"/>
@@ -8379,7 +8379,7 @@
           <a:p>
             <a:fld id="{084FC26D-2879-44C1-A7E8-03443A36CBFD}" type="datetimeFigureOut">
               <a:rPr kumimoji="1" lang="ja-JP" altLang="en-US" smtClean="0"/>
-              <a:t>2024/2/7</a:t>
+              <a:t>2024/2/11</a:t>
             </a:fld>
             <a:endParaRPr kumimoji="1" lang="ja-JP" altLang="en-US"/>
           </a:p>
@@ -8397,8 +8397,8 @@
         </p:nvSpPr>
         <p:spPr>
           <a:xfrm>
-            <a:off x="1788974" y="1834808"/>
-            <a:ext cx="1822728" cy="105396"/>
+            <a:off x="1788974" y="2002545"/>
+            <a:ext cx="1822728" cy="115031"/>
           </a:xfrm>
           <a:prstGeom prst="rect">
             <a:avLst/>
@@ -8408,7 +8408,7 @@
           <a:bodyPr vert="horz" lIns="91440" tIns="45720" rIns="91440" bIns="45720" rtlCol="0" anchor="ctr"/>
           <a:lstStyle>
             <a:lvl1pPr algn="ctr">
-              <a:defRPr sz="346">
+              <a:defRPr sz="378">
                 <a:solidFill>
                   <a:schemeClr val="tx1">
                     <a:tint val="75000"/>
@@ -8434,8 +8434,8 @@
         </p:nvSpPr>
         <p:spPr>
           <a:xfrm>
-            <a:off x="3814227" y="1834808"/>
-            <a:ext cx="1215152" cy="105396"/>
+            <a:off x="3814227" y="2002545"/>
+            <a:ext cx="1215152" cy="115031"/>
           </a:xfrm>
           <a:prstGeom prst="rect">
             <a:avLst/>
@@ -8445,7 +8445,7 @@
           <a:bodyPr vert="horz" lIns="91440" tIns="45720" rIns="91440" bIns="45720" rtlCol="0" anchor="ctr"/>
           <a:lstStyle>
             <a:lvl1pPr algn="r">
-              <a:defRPr sz="346">
+              <a:defRPr sz="378">
                 <a:solidFill>
                   <a:schemeClr val="tx1">
                     <a:tint val="75000"/>
@@ -8466,27 +8466,27 @@
     </p:spTree>
     <p:extLst>
       <p:ext uri="{BB962C8B-B14F-4D97-AF65-F5344CB8AC3E}">
-        <p14:creationId xmlns:p14="http://schemas.microsoft.com/office/powerpoint/2010/main" val="1684418899"/>
+        <p14:creationId xmlns:p14="http://schemas.microsoft.com/office/powerpoint/2010/main" val="1819391969"/>
       </p:ext>
     </p:extLst>
   </p:cSld>
   <p:clrMap bg1="lt1" tx1="dk1" bg2="lt2" tx2="dk2" accent1="accent1" accent2="accent2" accent3="accent3" accent4="accent4" accent5="accent5" accent6="accent6" hlink="hlink" folHlink="folHlink"/>
   <p:sldLayoutIdLst>
-    <p:sldLayoutId id="2147483769" r:id="rId1"/>
-    <p:sldLayoutId id="2147483770" r:id="rId2"/>
-    <p:sldLayoutId id="2147483771" r:id="rId3"/>
-    <p:sldLayoutId id="2147483772" r:id="rId4"/>
-    <p:sldLayoutId id="2147483773" r:id="rId5"/>
-    <p:sldLayoutId id="2147483774" r:id="rId6"/>
-    <p:sldLayoutId id="2147483775" r:id="rId7"/>
-    <p:sldLayoutId id="2147483776" r:id="rId8"/>
-    <p:sldLayoutId id="2147483777" r:id="rId9"/>
-    <p:sldLayoutId id="2147483778" r:id="rId10"/>
-    <p:sldLayoutId id="2147483779" r:id="rId11"/>
+    <p:sldLayoutId id="2147483781" r:id="rId1"/>
+    <p:sldLayoutId id="2147483782" r:id="rId2"/>
+    <p:sldLayoutId id="2147483783" r:id="rId3"/>
+    <p:sldLayoutId id="2147483784" r:id="rId4"/>
+    <p:sldLayoutId id="2147483785" r:id="rId5"/>
+    <p:sldLayoutId id="2147483786" r:id="rId6"/>
+    <p:sldLayoutId id="2147483787" r:id="rId7"/>
+    <p:sldLayoutId id="2147483788" r:id="rId8"/>
+    <p:sldLayoutId id="2147483789" r:id="rId9"/>
+    <p:sldLayoutId id="2147483790" r:id="rId10"/>
+    <p:sldLayoutId id="2147483791" r:id="rId11"/>
   </p:sldLayoutIdLst>
   <p:txStyles>
     <p:titleStyle>
-      <a:lvl1pPr algn="l" defTabSz="263987" rtl="0" eaLnBrk="1" latinLnBrk="0" hangingPunct="1">
+      <a:lvl1pPr algn="l" defTabSz="288036" rtl="0" eaLnBrk="1" latinLnBrk="0" hangingPunct="1">
         <a:lnSpc>
           <a:spcPct val="90000"/>
         </a:lnSpc>
@@ -8494,7 +8494,7 @@
           <a:spcPct val="0"/>
         </a:spcBef>
         <a:buNone/>
-        <a:defRPr kumimoji="1" sz="1270" kern="1200">
+        <a:defRPr kumimoji="1" sz="1386" kern="1200">
           <a:solidFill>
             <a:schemeClr val="tx1"/>
           </a:solidFill>
@@ -8505,16 +8505,16 @@
       </a:lvl1pPr>
     </p:titleStyle>
     <p:bodyStyle>
-      <a:lvl1pPr marL="65997" indent="-65997" algn="l" defTabSz="263987" rtl="0" eaLnBrk="1" latinLnBrk="0" hangingPunct="1">
+      <a:lvl1pPr marL="72009" indent="-72009" algn="l" defTabSz="288036" rtl="0" eaLnBrk="1" latinLnBrk="0" hangingPunct="1">
         <a:lnSpc>
           <a:spcPct val="90000"/>
         </a:lnSpc>
         <a:spcBef>
-          <a:spcPts val="289"/>
+          <a:spcPts val="315"/>
         </a:spcBef>
         <a:buFont typeface="Arial" panose="020B0604020202020204" pitchFamily="34" charset="0"/>
         <a:buChar char="•"/>
-        <a:defRPr kumimoji="1" sz="808" kern="1200">
+        <a:defRPr kumimoji="1" sz="882" kern="1200">
           <a:solidFill>
             <a:schemeClr val="tx1"/>
           </a:solidFill>
@@ -8523,16 +8523,16 @@
           <a:cs typeface="+mn-cs"/>
         </a:defRPr>
       </a:lvl1pPr>
-      <a:lvl2pPr marL="197990" indent="-65997" algn="l" defTabSz="263987" rtl="0" eaLnBrk="1" latinLnBrk="0" hangingPunct="1">
+      <a:lvl2pPr marL="216027" indent="-72009" algn="l" defTabSz="288036" rtl="0" eaLnBrk="1" latinLnBrk="0" hangingPunct="1">
         <a:lnSpc>
           <a:spcPct val="90000"/>
         </a:lnSpc>
         <a:spcBef>
-          <a:spcPts val="144"/>
+          <a:spcPts val="158"/>
         </a:spcBef>
         <a:buFont typeface="Arial" panose="020B0604020202020204" pitchFamily="34" charset="0"/>
         <a:buChar char="•"/>
-        <a:defRPr kumimoji="1" sz="693" kern="1200">
+        <a:defRPr kumimoji="1" sz="756" kern="1200">
           <a:solidFill>
             <a:schemeClr val="tx1"/>
           </a:solidFill>
@@ -8541,16 +8541,16 @@
           <a:cs typeface="+mn-cs"/>
         </a:defRPr>
       </a:lvl2pPr>
-      <a:lvl3pPr marL="329984" indent="-65997" algn="l" defTabSz="263987" rtl="0" eaLnBrk="1" latinLnBrk="0" hangingPunct="1">
+      <a:lvl3pPr marL="360045" indent="-72009" algn="l" defTabSz="288036" rtl="0" eaLnBrk="1" latinLnBrk="0" hangingPunct="1">
         <a:lnSpc>
           <a:spcPct val="90000"/>
         </a:lnSpc>
         <a:spcBef>
-          <a:spcPts val="144"/>
+          <a:spcPts val="158"/>
         </a:spcBef>
         <a:buFont typeface="Arial" panose="020B0604020202020204" pitchFamily="34" charset="0"/>
         <a:buChar char="•"/>
-        <a:defRPr kumimoji="1" sz="577" kern="1200">
+        <a:defRPr kumimoji="1" sz="630" kern="1200">
           <a:solidFill>
             <a:schemeClr val="tx1"/>
           </a:solidFill>
@@ -8559,16 +8559,16 @@
           <a:cs typeface="+mn-cs"/>
         </a:defRPr>
       </a:lvl3pPr>
-      <a:lvl4pPr marL="461978" indent="-65997" algn="l" defTabSz="263987" rtl="0" eaLnBrk="1" latinLnBrk="0" hangingPunct="1">
+      <a:lvl4pPr marL="504063" indent="-72009" algn="l" defTabSz="288036" rtl="0" eaLnBrk="1" latinLnBrk="0" hangingPunct="1">
         <a:lnSpc>
           <a:spcPct val="90000"/>
         </a:lnSpc>
         <a:spcBef>
-          <a:spcPts val="144"/>
+          <a:spcPts val="158"/>
         </a:spcBef>
         <a:buFont typeface="Arial" panose="020B0604020202020204" pitchFamily="34" charset="0"/>
         <a:buChar char="•"/>
-        <a:defRPr kumimoji="1" sz="520" kern="1200">
+        <a:defRPr kumimoji="1" sz="567" kern="1200">
           <a:solidFill>
             <a:schemeClr val="tx1"/>
           </a:solidFill>
@@ -8577,16 +8577,16 @@
           <a:cs typeface="+mn-cs"/>
         </a:defRPr>
       </a:lvl4pPr>
-      <a:lvl5pPr marL="593971" indent="-65997" algn="l" defTabSz="263987" rtl="0" eaLnBrk="1" latinLnBrk="0" hangingPunct="1">
+      <a:lvl5pPr marL="648081" indent="-72009" algn="l" defTabSz="288036" rtl="0" eaLnBrk="1" latinLnBrk="0" hangingPunct="1">
         <a:lnSpc>
           <a:spcPct val="90000"/>
         </a:lnSpc>
         <a:spcBef>
-          <a:spcPts val="144"/>
+          <a:spcPts val="158"/>
         </a:spcBef>
         <a:buFont typeface="Arial" panose="020B0604020202020204" pitchFamily="34" charset="0"/>
         <a:buChar char="•"/>
-        <a:defRPr kumimoji="1" sz="520" kern="1200">
+        <a:defRPr kumimoji="1" sz="567" kern="1200">
           <a:solidFill>
             <a:schemeClr val="tx1"/>
           </a:solidFill>
@@ -8595,16 +8595,16 @@
           <a:cs typeface="+mn-cs"/>
         </a:defRPr>
       </a:lvl5pPr>
-      <a:lvl6pPr marL="725965" indent="-65997" algn="l" defTabSz="263987" rtl="0" eaLnBrk="1" latinLnBrk="0" hangingPunct="1">
+      <a:lvl6pPr marL="792099" indent="-72009" algn="l" defTabSz="288036" rtl="0" eaLnBrk="1" latinLnBrk="0" hangingPunct="1">
         <a:lnSpc>
           <a:spcPct val="90000"/>
         </a:lnSpc>
         <a:spcBef>
-          <a:spcPts val="144"/>
+          <a:spcPts val="158"/>
         </a:spcBef>
         <a:buFont typeface="Arial" panose="020B0604020202020204" pitchFamily="34" charset="0"/>
         <a:buChar char="•"/>
-        <a:defRPr kumimoji="1" sz="520" kern="1200">
+        <a:defRPr kumimoji="1" sz="567" kern="1200">
           <a:solidFill>
             <a:schemeClr val="tx1"/>
           </a:solidFill>
@@ -8613,16 +8613,16 @@
           <a:cs typeface="+mn-cs"/>
         </a:defRPr>
       </a:lvl6pPr>
-      <a:lvl7pPr marL="857959" indent="-65997" algn="l" defTabSz="263987" rtl="0" eaLnBrk="1" latinLnBrk="0" hangingPunct="1">
+      <a:lvl7pPr marL="936117" indent="-72009" algn="l" defTabSz="288036" rtl="0" eaLnBrk="1" latinLnBrk="0" hangingPunct="1">
         <a:lnSpc>
           <a:spcPct val="90000"/>
         </a:lnSpc>
         <a:spcBef>
-          <a:spcPts val="144"/>
+          <a:spcPts val="158"/>
         </a:spcBef>
         <a:buFont typeface="Arial" panose="020B0604020202020204" pitchFamily="34" charset="0"/>
         <a:buChar char="•"/>
-        <a:defRPr kumimoji="1" sz="520" kern="1200">
+        <a:defRPr kumimoji="1" sz="567" kern="1200">
           <a:solidFill>
             <a:schemeClr val="tx1"/>
           </a:solidFill>
@@ -8631,16 +8631,16 @@
           <a:cs typeface="+mn-cs"/>
         </a:defRPr>
       </a:lvl7pPr>
-      <a:lvl8pPr marL="989952" indent="-65997" algn="l" defTabSz="263987" rtl="0" eaLnBrk="1" latinLnBrk="0" hangingPunct="1">
+      <a:lvl8pPr marL="1080135" indent="-72009" algn="l" defTabSz="288036" rtl="0" eaLnBrk="1" latinLnBrk="0" hangingPunct="1">
         <a:lnSpc>
           <a:spcPct val="90000"/>
         </a:lnSpc>
         <a:spcBef>
-          <a:spcPts val="144"/>
+          <a:spcPts val="158"/>
         </a:spcBef>
         <a:buFont typeface="Arial" panose="020B0604020202020204" pitchFamily="34" charset="0"/>
         <a:buChar char="•"/>
-        <a:defRPr kumimoji="1" sz="520" kern="1200">
+        <a:defRPr kumimoji="1" sz="567" kern="1200">
           <a:solidFill>
             <a:schemeClr val="tx1"/>
           </a:solidFill>
@@ -8649,16 +8649,16 @@
           <a:cs typeface="+mn-cs"/>
         </a:defRPr>
       </a:lvl8pPr>
-      <a:lvl9pPr marL="1121946" indent="-65997" algn="l" defTabSz="263987" rtl="0" eaLnBrk="1" latinLnBrk="0" hangingPunct="1">
+      <a:lvl9pPr marL="1224153" indent="-72009" algn="l" defTabSz="288036" rtl="0" eaLnBrk="1" latinLnBrk="0" hangingPunct="1">
         <a:lnSpc>
           <a:spcPct val="90000"/>
         </a:lnSpc>
         <a:spcBef>
-          <a:spcPts val="144"/>
+          <a:spcPts val="158"/>
         </a:spcBef>
         <a:buFont typeface="Arial" panose="020B0604020202020204" pitchFamily="34" charset="0"/>
         <a:buChar char="•"/>
-        <a:defRPr kumimoji="1" sz="520" kern="1200">
+        <a:defRPr kumimoji="1" sz="567" kern="1200">
           <a:solidFill>
             <a:schemeClr val="tx1"/>
           </a:solidFill>
@@ -8672,8 +8672,8 @@
       <a:defPPr>
         <a:defRPr lang="en-US"/>
       </a:defPPr>
-      <a:lvl1pPr marL="0" algn="l" defTabSz="263987" rtl="0" eaLnBrk="1" latinLnBrk="0" hangingPunct="1">
-        <a:defRPr kumimoji="1" sz="520" kern="1200">
+      <a:lvl1pPr marL="0" algn="l" defTabSz="288036" rtl="0" eaLnBrk="1" latinLnBrk="0" hangingPunct="1">
+        <a:defRPr kumimoji="1" sz="567" kern="1200">
           <a:solidFill>
             <a:schemeClr val="tx1"/>
           </a:solidFill>
@@ -8682,8 +8682,8 @@
           <a:cs typeface="+mn-cs"/>
         </a:defRPr>
       </a:lvl1pPr>
-      <a:lvl2pPr marL="131994" algn="l" defTabSz="263987" rtl="0" eaLnBrk="1" latinLnBrk="0" hangingPunct="1">
-        <a:defRPr kumimoji="1" sz="520" kern="1200">
+      <a:lvl2pPr marL="144018" algn="l" defTabSz="288036" rtl="0" eaLnBrk="1" latinLnBrk="0" hangingPunct="1">
+        <a:defRPr kumimoji="1" sz="567" kern="1200">
           <a:solidFill>
             <a:schemeClr val="tx1"/>
           </a:solidFill>
@@ -8692,8 +8692,8 @@
           <a:cs typeface="+mn-cs"/>
         </a:defRPr>
       </a:lvl2pPr>
-      <a:lvl3pPr marL="263987" algn="l" defTabSz="263987" rtl="0" eaLnBrk="1" latinLnBrk="0" hangingPunct="1">
-        <a:defRPr kumimoji="1" sz="520" kern="1200">
+      <a:lvl3pPr marL="288036" algn="l" defTabSz="288036" rtl="0" eaLnBrk="1" latinLnBrk="0" hangingPunct="1">
+        <a:defRPr kumimoji="1" sz="567" kern="1200">
           <a:solidFill>
             <a:schemeClr val="tx1"/>
           </a:solidFill>
@@ -8702,8 +8702,8 @@
           <a:cs typeface="+mn-cs"/>
         </a:defRPr>
       </a:lvl3pPr>
-      <a:lvl4pPr marL="395981" algn="l" defTabSz="263987" rtl="0" eaLnBrk="1" latinLnBrk="0" hangingPunct="1">
-        <a:defRPr kumimoji="1" sz="520" kern="1200">
+      <a:lvl4pPr marL="432054" algn="l" defTabSz="288036" rtl="0" eaLnBrk="1" latinLnBrk="0" hangingPunct="1">
+        <a:defRPr kumimoji="1" sz="567" kern="1200">
           <a:solidFill>
             <a:schemeClr val="tx1"/>
           </a:solidFill>
@@ -8712,8 +8712,8 @@
           <a:cs typeface="+mn-cs"/>
         </a:defRPr>
       </a:lvl4pPr>
-      <a:lvl5pPr marL="527975" algn="l" defTabSz="263987" rtl="0" eaLnBrk="1" latinLnBrk="0" hangingPunct="1">
-        <a:defRPr kumimoji="1" sz="520" kern="1200">
+      <a:lvl5pPr marL="576072" algn="l" defTabSz="288036" rtl="0" eaLnBrk="1" latinLnBrk="0" hangingPunct="1">
+        <a:defRPr kumimoji="1" sz="567" kern="1200">
           <a:solidFill>
             <a:schemeClr val="tx1"/>
           </a:solidFill>
@@ -8722,8 +8722,8 @@
           <a:cs typeface="+mn-cs"/>
         </a:defRPr>
       </a:lvl5pPr>
-      <a:lvl6pPr marL="659968" algn="l" defTabSz="263987" rtl="0" eaLnBrk="1" latinLnBrk="0" hangingPunct="1">
-        <a:defRPr kumimoji="1" sz="520" kern="1200">
+      <a:lvl6pPr marL="720090" algn="l" defTabSz="288036" rtl="0" eaLnBrk="1" latinLnBrk="0" hangingPunct="1">
+        <a:defRPr kumimoji="1" sz="567" kern="1200">
           <a:solidFill>
             <a:schemeClr val="tx1"/>
           </a:solidFill>
@@ -8732,8 +8732,8 @@
           <a:cs typeface="+mn-cs"/>
         </a:defRPr>
       </a:lvl6pPr>
-      <a:lvl7pPr marL="791962" algn="l" defTabSz="263987" rtl="0" eaLnBrk="1" latinLnBrk="0" hangingPunct="1">
-        <a:defRPr kumimoji="1" sz="520" kern="1200">
+      <a:lvl7pPr marL="864108" algn="l" defTabSz="288036" rtl="0" eaLnBrk="1" latinLnBrk="0" hangingPunct="1">
+        <a:defRPr kumimoji="1" sz="567" kern="1200">
           <a:solidFill>
             <a:schemeClr val="tx1"/>
           </a:solidFill>
@@ -8742,8 +8742,8 @@
           <a:cs typeface="+mn-cs"/>
         </a:defRPr>
       </a:lvl7pPr>
-      <a:lvl8pPr marL="923955" algn="l" defTabSz="263987" rtl="0" eaLnBrk="1" latinLnBrk="0" hangingPunct="1">
-        <a:defRPr kumimoji="1" sz="520" kern="1200">
+      <a:lvl8pPr marL="1008126" algn="l" defTabSz="288036" rtl="0" eaLnBrk="1" latinLnBrk="0" hangingPunct="1">
+        <a:defRPr kumimoji="1" sz="567" kern="1200">
           <a:solidFill>
             <a:schemeClr val="tx1"/>
           </a:solidFill>
@@ -8752,8 +8752,8 @@
           <a:cs typeface="+mn-cs"/>
         </a:defRPr>
       </a:lvl8pPr>
-      <a:lvl9pPr marL="1055949" algn="l" defTabSz="263987" rtl="0" eaLnBrk="1" latinLnBrk="0" hangingPunct="1">
-        <a:defRPr kumimoji="1" sz="520" kern="1200">
+      <a:lvl9pPr marL="1152144" algn="l" defTabSz="288036" rtl="0" eaLnBrk="1" latinLnBrk="0" hangingPunct="1">
+        <a:defRPr kumimoji="1" sz="567" kern="1200">
           <a:solidFill>
             <a:schemeClr val="tx1"/>
           </a:solidFill>
@@ -8798,10 +8798,10 @@
         </p:nvGrpSpPr>
         <p:grpSpPr>
           <a:xfrm>
-            <a:off x="-14938" y="-258701"/>
-            <a:ext cx="5415612" cy="2488602"/>
-            <a:chOff x="-8167" y="-16649"/>
-            <a:chExt cx="2960917" cy="1508570"/>
+            <a:off x="-263198" y="-282350"/>
+            <a:ext cx="5910736" cy="2716173"/>
+            <a:chOff x="-8183" y="-16649"/>
+            <a:chExt cx="2960933" cy="1508606"/>
           </a:xfrm>
         </p:grpSpPr>
         <p:graphicFrame>
@@ -8847,7 +8847,7 @@
           <p:spPr>
             <a:xfrm>
               <a:off x="455876" y="1355451"/>
-              <a:ext cx="1680374" cy="136470"/>
+              <a:ext cx="1680374" cy="136506"/>
             </a:xfrm>
             <a:prstGeom prst="rect">
               <a:avLst/>
@@ -8862,13 +8862,13 @@
             <a:p>
               <a:pPr algn="ctr"/>
               <a:r>
-                <a:rPr kumimoji="1" lang="en-US" altLang="ja-JP" sz="1463" dirty="0">
+                <a:rPr kumimoji="1" lang="en-US" altLang="ja-JP" sz="1597" dirty="0">
                   <a:latin typeface="Cambria Math" panose="02040503050406030204" pitchFamily="18" charset="0"/>
                   <a:ea typeface="Cambria Math" panose="02040503050406030204" pitchFamily="18" charset="0"/>
                 </a:rPr>
                 <a:t># of threads</a:t>
               </a:r>
-              <a:endParaRPr kumimoji="1" lang="ja-JP" altLang="en-US" sz="1463" dirty="0">
+              <a:endParaRPr kumimoji="1" lang="ja-JP" altLang="en-US" sz="1597" dirty="0">
                 <a:latin typeface="Cambria Math" panose="02040503050406030204" pitchFamily="18" charset="0"/>
               </a:endParaRPr>
             </a:p>
@@ -8888,8 +8888,8 @@
           </p:nvSpPr>
           <p:spPr>
             <a:xfrm rot="16200000">
-              <a:off x="-528259" y="594226"/>
-              <a:ext cx="1163269" cy="123085"/>
+              <a:off x="-528259" y="594210"/>
+              <a:ext cx="1163269" cy="123118"/>
             </a:xfrm>
             <a:prstGeom prst="rect">
               <a:avLst/>
@@ -8904,27 +8904,27 @@
             <a:p>
               <a:pPr algn="ctr"/>
               <a:r>
-                <a:rPr kumimoji="1" lang="en-US" altLang="ja-JP" sz="1463" dirty="0">
+                <a:rPr kumimoji="1" lang="en-US" altLang="ja-JP" sz="1597" dirty="0">
                   <a:latin typeface="Cambria Math" panose="02040503050406030204" pitchFamily="18" charset="0"/>
                   <a:ea typeface="Cambria Math" panose="02040503050406030204" pitchFamily="18" charset="0"/>
                 </a:rPr>
                 <a:t>Throughput [</a:t>
               </a:r>
               <a:r>
-                <a:rPr kumimoji="1" lang="en-US" altLang="ja-JP" sz="1463" dirty="0" err="1">
+                <a:rPr kumimoji="1" lang="en-US" altLang="ja-JP" sz="1597" dirty="0" err="1">
                   <a:latin typeface="Cambria Math" panose="02040503050406030204" pitchFamily="18" charset="0"/>
                   <a:ea typeface="Cambria Math" panose="02040503050406030204" pitchFamily="18" charset="0"/>
                 </a:rPr>
                 <a:t>MOps</a:t>
               </a:r>
               <a:r>
-                <a:rPr kumimoji="1" lang="en-US" altLang="ja-JP" sz="1463" dirty="0">
+                <a:rPr kumimoji="1" lang="en-US" altLang="ja-JP" sz="1597" dirty="0">
                   <a:latin typeface="Cambria Math" panose="02040503050406030204" pitchFamily="18" charset="0"/>
                   <a:ea typeface="Cambria Math" panose="02040503050406030204" pitchFamily="18" charset="0"/>
                 </a:rPr>
                 <a:t>/s]</a:t>
               </a:r>
-              <a:endParaRPr kumimoji="1" lang="ja-JP" altLang="en-US" sz="1463" dirty="0">
+              <a:endParaRPr kumimoji="1" lang="ja-JP" altLang="en-US" sz="1597" dirty="0">
                 <a:latin typeface="Cambria Math" panose="02040503050406030204" pitchFamily="18" charset="0"/>
               </a:endParaRPr>
             </a:p>
@@ -8975,10 +8975,10 @@
         </p:nvGrpSpPr>
         <p:grpSpPr>
           <a:xfrm>
-            <a:off x="-14938" y="-258700"/>
-            <a:ext cx="5415612" cy="2488603"/>
-            <a:chOff x="-8167" y="-16649"/>
-            <a:chExt cx="2960917" cy="1508569"/>
+            <a:off x="-263199" y="-282350"/>
+            <a:ext cx="5910736" cy="2716176"/>
+            <a:chOff x="-8183" y="-16649"/>
+            <a:chExt cx="2960933" cy="1508606"/>
           </a:xfrm>
         </p:grpSpPr>
         <p:graphicFrame>
@@ -9024,7 +9024,7 @@
           <p:spPr>
             <a:xfrm>
               <a:off x="455876" y="1355451"/>
-              <a:ext cx="1680374" cy="136469"/>
+              <a:ext cx="1680374" cy="136506"/>
             </a:xfrm>
             <a:prstGeom prst="rect">
               <a:avLst/>
@@ -9039,20 +9039,20 @@
             <a:p>
               <a:pPr algn="ctr"/>
               <a:r>
-                <a:rPr kumimoji="1" lang="ja-JP" altLang="en-US" sz="1463" dirty="0">
+                <a:rPr kumimoji="1" lang="ja-JP" altLang="en-US" sz="1597" dirty="0">
                   <a:latin typeface="Cambria Math" panose="02040503050406030204" pitchFamily="18" charset="0"/>
                   <a:ea typeface="Cambria Math" panose="02040503050406030204" pitchFamily="18" charset="0"/>
                 </a:rPr>
                 <a:t>ページサイズ</a:t>
               </a:r>
               <a:r>
-                <a:rPr kumimoji="1" lang="en-US" altLang="ja-JP" sz="1463" dirty="0">
+                <a:rPr kumimoji="1" lang="en-US" altLang="ja-JP" sz="1597" dirty="0">
                   <a:latin typeface="Cambria Math" panose="02040503050406030204" pitchFamily="18" charset="0"/>
                   <a:ea typeface="Cambria Math" panose="02040503050406030204" pitchFamily="18" charset="0"/>
                 </a:rPr>
                 <a:t>[byte]</a:t>
               </a:r>
-              <a:endParaRPr kumimoji="1" lang="ja-JP" altLang="en-US" sz="1463" dirty="0">
+              <a:endParaRPr kumimoji="1" lang="ja-JP" altLang="en-US" sz="1597" dirty="0">
                 <a:latin typeface="Cambria Math" panose="02040503050406030204" pitchFamily="18" charset="0"/>
               </a:endParaRPr>
             </a:p>
@@ -9072,8 +9072,8 @@
           </p:nvSpPr>
           <p:spPr>
             <a:xfrm rot="16200000">
-              <a:off x="-528259" y="594227"/>
-              <a:ext cx="1163269" cy="123085"/>
+              <a:off x="-528259" y="594210"/>
+              <a:ext cx="1163269" cy="123118"/>
             </a:xfrm>
             <a:prstGeom prst="rect">
               <a:avLst/>
@@ -9088,34 +9088,34 @@
             <a:p>
               <a:pPr algn="ctr"/>
               <a:r>
-                <a:rPr kumimoji="1" lang="ja-JP" altLang="en-US" sz="1463" dirty="0">
+                <a:rPr kumimoji="1" lang="ja-JP" altLang="en-US" sz="1597" dirty="0">
                   <a:latin typeface="Cambria Math" panose="02040503050406030204" pitchFamily="18" charset="0"/>
                   <a:ea typeface="Cambria Math" panose="02040503050406030204" pitchFamily="18" charset="0"/>
                 </a:rPr>
                 <a:t>スループット</a:t>
               </a:r>
               <a:r>
-                <a:rPr kumimoji="1" lang="en-US" altLang="ja-JP" sz="1463" dirty="0">
+                <a:rPr kumimoji="1" lang="en-US" altLang="ja-JP" sz="1597" dirty="0">
                   <a:latin typeface="Cambria Math" panose="02040503050406030204" pitchFamily="18" charset="0"/>
                   <a:ea typeface="Cambria Math" panose="02040503050406030204" pitchFamily="18" charset="0"/>
                 </a:rPr>
                 <a:t> [</a:t>
               </a:r>
               <a:r>
-                <a:rPr kumimoji="1" lang="en-US" altLang="ja-JP" sz="1463" dirty="0" err="1">
+                <a:rPr kumimoji="1" lang="en-US" altLang="ja-JP" sz="1597" dirty="0" err="1">
                   <a:latin typeface="Cambria Math" panose="02040503050406030204" pitchFamily="18" charset="0"/>
                   <a:ea typeface="Cambria Math" panose="02040503050406030204" pitchFamily="18" charset="0"/>
                 </a:rPr>
                 <a:t>MOps</a:t>
               </a:r>
               <a:r>
-                <a:rPr kumimoji="1" lang="en-US" altLang="ja-JP" sz="1463" dirty="0">
+                <a:rPr kumimoji="1" lang="en-US" altLang="ja-JP" sz="1597" dirty="0">
                   <a:latin typeface="Cambria Math" panose="02040503050406030204" pitchFamily="18" charset="0"/>
                   <a:ea typeface="Cambria Math" panose="02040503050406030204" pitchFamily="18" charset="0"/>
                 </a:rPr>
                 <a:t>/s]</a:t>
               </a:r>
-              <a:endParaRPr kumimoji="1" lang="ja-JP" altLang="en-US" sz="1463" dirty="0">
+              <a:endParaRPr kumimoji="1" lang="ja-JP" altLang="en-US" sz="1597" dirty="0">
                 <a:latin typeface="Cambria Math" panose="02040503050406030204" pitchFamily="18" charset="0"/>
               </a:endParaRPr>
             </a:p>
@@ -9172,10 +9172,10 @@
         </p:nvGrpSpPr>
         <p:grpSpPr>
           <a:xfrm>
-            <a:off x="-14938" y="-258700"/>
-            <a:ext cx="5415612" cy="2488603"/>
-            <a:chOff x="-8167" y="-16649"/>
-            <a:chExt cx="2960917" cy="1508569"/>
+            <a:off x="-263199" y="-282350"/>
+            <a:ext cx="5910736" cy="2716176"/>
+            <a:chOff x="-8183" y="-16649"/>
+            <a:chExt cx="2960933" cy="1508606"/>
           </a:xfrm>
         </p:grpSpPr>
         <p:graphicFrame>
@@ -9221,7 +9221,7 @@
           <p:spPr>
             <a:xfrm>
               <a:off x="455876" y="1355451"/>
-              <a:ext cx="1680374" cy="136469"/>
+              <a:ext cx="1680374" cy="136506"/>
             </a:xfrm>
             <a:prstGeom prst="rect">
               <a:avLst/>
@@ -9236,20 +9236,20 @@
             <a:p>
               <a:pPr algn="ctr"/>
               <a:r>
-                <a:rPr kumimoji="1" lang="ja-JP" altLang="en-US" sz="1463" dirty="0">
+                <a:rPr kumimoji="1" lang="ja-JP" altLang="en-US" sz="1597" dirty="0">
                   <a:latin typeface="Cambria Math" panose="02040503050406030204" pitchFamily="18" charset="0"/>
                   <a:ea typeface="Cambria Math" panose="02040503050406030204" pitchFamily="18" charset="0"/>
                 </a:rPr>
                 <a:t>ページサイズ</a:t>
               </a:r>
               <a:r>
-                <a:rPr kumimoji="1" lang="en-US" altLang="ja-JP" sz="1463" dirty="0">
+                <a:rPr kumimoji="1" lang="en-US" altLang="ja-JP" sz="1597" dirty="0">
                   <a:latin typeface="Cambria Math" panose="02040503050406030204" pitchFamily="18" charset="0"/>
                   <a:ea typeface="Cambria Math" panose="02040503050406030204" pitchFamily="18" charset="0"/>
                 </a:rPr>
                 <a:t>[byte]</a:t>
               </a:r>
-              <a:endParaRPr kumimoji="1" lang="ja-JP" altLang="en-US" sz="1463" dirty="0">
+              <a:endParaRPr kumimoji="1" lang="ja-JP" altLang="en-US" sz="1597" dirty="0">
                 <a:latin typeface="Cambria Math" panose="02040503050406030204" pitchFamily="18" charset="0"/>
               </a:endParaRPr>
             </a:p>
@@ -9269,8 +9269,8 @@
           </p:nvSpPr>
           <p:spPr>
             <a:xfrm rot="16200000">
-              <a:off x="-528259" y="594227"/>
-              <a:ext cx="1163269" cy="123085"/>
+              <a:off x="-528259" y="594210"/>
+              <a:ext cx="1163269" cy="123118"/>
             </a:xfrm>
             <a:prstGeom prst="rect">
               <a:avLst/>
@@ -9285,34 +9285,34 @@
             <a:p>
               <a:pPr algn="ctr"/>
               <a:r>
-                <a:rPr kumimoji="1" lang="ja-JP" altLang="en-US" sz="1463" dirty="0">
+                <a:rPr kumimoji="1" lang="ja-JP" altLang="en-US" sz="1597" dirty="0">
                   <a:latin typeface="Cambria Math" panose="02040503050406030204" pitchFamily="18" charset="0"/>
                   <a:ea typeface="Cambria Math" panose="02040503050406030204" pitchFamily="18" charset="0"/>
                 </a:rPr>
                 <a:t>スループット</a:t>
               </a:r>
               <a:r>
-                <a:rPr kumimoji="1" lang="en-US" altLang="ja-JP" sz="1463" dirty="0">
+                <a:rPr kumimoji="1" lang="en-US" altLang="ja-JP" sz="1597" dirty="0">
                   <a:latin typeface="Cambria Math" panose="02040503050406030204" pitchFamily="18" charset="0"/>
                   <a:ea typeface="Cambria Math" panose="02040503050406030204" pitchFamily="18" charset="0"/>
                 </a:rPr>
                 <a:t> [</a:t>
               </a:r>
               <a:r>
-                <a:rPr kumimoji="1" lang="en-US" altLang="ja-JP" sz="1463" dirty="0" err="1">
+                <a:rPr kumimoji="1" lang="en-US" altLang="ja-JP" sz="1597" dirty="0" err="1">
                   <a:latin typeface="Cambria Math" panose="02040503050406030204" pitchFamily="18" charset="0"/>
                   <a:ea typeface="Cambria Math" panose="02040503050406030204" pitchFamily="18" charset="0"/>
                 </a:rPr>
                 <a:t>MOps</a:t>
               </a:r>
               <a:r>
-                <a:rPr kumimoji="1" lang="en-US" altLang="ja-JP" sz="1463" dirty="0">
+                <a:rPr kumimoji="1" lang="en-US" altLang="ja-JP" sz="1597" dirty="0">
                   <a:latin typeface="Cambria Math" panose="02040503050406030204" pitchFamily="18" charset="0"/>
                   <a:ea typeface="Cambria Math" panose="02040503050406030204" pitchFamily="18" charset="0"/>
                 </a:rPr>
                 <a:t>/s]</a:t>
               </a:r>
-              <a:endParaRPr kumimoji="1" lang="ja-JP" altLang="en-US" sz="1463" dirty="0">
+              <a:endParaRPr kumimoji="1" lang="ja-JP" altLang="en-US" sz="1597" dirty="0">
                 <a:latin typeface="Cambria Math" panose="02040503050406030204" pitchFamily="18" charset="0"/>
               </a:endParaRPr>
             </a:p>
@@ -9351,10 +9351,10 @@
       </p:grpSpPr>
       <p:grpSp>
         <p:nvGrpSpPr>
-          <p:cNvPr id="6" name="グループ化 5">
+          <p:cNvPr id="2" name="グループ化 1">
             <a:extLst>
               <a:ext uri="{FF2B5EF4-FFF2-40B4-BE49-F238E27FC236}">
-                <a16:creationId xmlns:a16="http://schemas.microsoft.com/office/drawing/2014/main" id="{377B93E1-E178-95F5-D90D-D04E8B76B696}"/>
+                <a16:creationId xmlns:a16="http://schemas.microsoft.com/office/drawing/2014/main" id="{7E223317-40B6-709B-6651-32634170FFD8}"/>
               </a:ext>
             </a:extLst>
           </p:cNvPr>
@@ -9363,314 +9363,419 @@
         </p:nvGrpSpPr>
         <p:grpSpPr>
           <a:xfrm>
-            <a:off x="27949" y="-254"/>
-            <a:ext cx="2625073" cy="1934799"/>
-            <a:chOff x="-45642" y="-69361"/>
-            <a:chExt cx="2996661" cy="1257718"/>
+            <a:off x="-1" y="-37214"/>
+            <a:ext cx="5400675" cy="2036135"/>
+            <a:chOff x="0" y="0"/>
+            <a:chExt cx="5863917" cy="2111677"/>
           </a:xfrm>
         </p:grpSpPr>
-        <p:graphicFrame>
-          <p:nvGraphicFramePr>
-            <p:cNvPr id="7" name="グラフ 6">
+        <p:grpSp>
+          <p:nvGrpSpPr>
+            <p:cNvPr id="6" name="グループ化 5">
               <a:extLst>
                 <a:ext uri="{FF2B5EF4-FFF2-40B4-BE49-F238E27FC236}">
-                  <a16:creationId xmlns:a16="http://schemas.microsoft.com/office/drawing/2014/main" id="{70B10182-AFD4-F251-6CAF-9BCD3F010963}"/>
+                  <a16:creationId xmlns:a16="http://schemas.microsoft.com/office/drawing/2014/main" id="{377B93E1-E178-95F5-D90D-D04E8B76B696}"/>
                 </a:ext>
               </a:extLst>
             </p:cNvPr>
-            <p:cNvGraphicFramePr/>
-            <p:nvPr>
-              <p:extLst>
-                <p:ext uri="{D42A27DB-BD31-4B8C-83A1-F6EECF244321}">
-                  <p14:modId xmlns:p14="http://schemas.microsoft.com/office/powerpoint/2010/main" val="384887579"/>
-                </p:ext>
-              </p:extLst>
-            </p:nvPr>
-          </p:nvGraphicFramePr>
-          <p:xfrm>
-            <a:off x="179503" y="-69361"/>
-            <a:ext cx="2771516" cy="1257717"/>
-          </p:xfrm>
-          <a:graphic>
-            <a:graphicData uri="http://schemas.openxmlformats.org/drawingml/2006/chart">
-              <c:chart xmlns:c="http://schemas.openxmlformats.org/drawingml/2006/chart" xmlns:r="http://schemas.openxmlformats.org/officeDocument/2006/relationships" r:id="rId2"/>
-            </a:graphicData>
-          </a:graphic>
-        </p:graphicFrame>
-        <p:sp>
-          <p:nvSpPr>
-            <p:cNvPr id="8" name="テキスト ボックス 7">
+            <p:cNvGrpSpPr/>
+            <p:nvPr/>
+          </p:nvGrpSpPr>
+          <p:grpSpPr>
+            <a:xfrm>
+              <a:off x="0" y="0"/>
+              <a:ext cx="2865076" cy="2111677"/>
+              <a:chOff x="-45663" y="-69361"/>
+              <a:chExt cx="2996682" cy="1257718"/>
+            </a:xfrm>
+          </p:grpSpPr>
+          <p:graphicFrame>
+            <p:nvGraphicFramePr>
+              <p:cNvPr id="7" name="グラフ 6">
+                <a:extLst>
+                  <a:ext uri="{FF2B5EF4-FFF2-40B4-BE49-F238E27FC236}">
+                    <a16:creationId xmlns:a16="http://schemas.microsoft.com/office/drawing/2014/main" id="{70B10182-AFD4-F251-6CAF-9BCD3F010963}"/>
+                  </a:ext>
+                </a:extLst>
+              </p:cNvPr>
+              <p:cNvGraphicFramePr/>
+              <p:nvPr>
+                <p:extLst>
+                  <p:ext uri="{D42A27DB-BD31-4B8C-83A1-F6EECF244321}">
+                    <p14:modId xmlns:p14="http://schemas.microsoft.com/office/powerpoint/2010/main" val="1319057450"/>
+                  </p:ext>
+                </p:extLst>
+              </p:nvPr>
+            </p:nvGraphicFramePr>
+            <p:xfrm>
+              <a:off x="179503" y="-69361"/>
+              <a:ext cx="2771516" cy="1257717"/>
+            </p:xfrm>
+            <a:graphic>
+              <a:graphicData uri="http://schemas.openxmlformats.org/drawingml/2006/chart">
+                <c:chart xmlns:c="http://schemas.openxmlformats.org/drawingml/2006/chart" xmlns:r="http://schemas.openxmlformats.org/officeDocument/2006/relationships" r:id="rId2"/>
+              </a:graphicData>
+            </a:graphic>
+          </p:graphicFrame>
+          <p:sp>
+            <p:nvSpPr>
+              <p:cNvPr id="8" name="テキスト ボックス 7">
+                <a:extLst>
+                  <a:ext uri="{FF2B5EF4-FFF2-40B4-BE49-F238E27FC236}">
+                    <a16:creationId xmlns:a16="http://schemas.microsoft.com/office/drawing/2014/main" id="{EF4DFC79-4932-E3FF-DBEE-140BAB665251}"/>
+                  </a:ext>
+                </a:extLst>
+              </p:cNvPr>
+              <p:cNvSpPr txBox="1"/>
+              <p:nvPr/>
+            </p:nvSpPr>
+            <p:spPr>
+              <a:xfrm>
+                <a:off x="333022" y="1058532"/>
+                <a:ext cx="2333480" cy="104562"/>
+              </a:xfrm>
+              <a:prstGeom prst="rect">
+                <a:avLst/>
+              </a:prstGeom>
+              <a:noFill/>
+            </p:spPr>
+            <p:txBody>
+              <a:bodyPr wrap="square" lIns="0" tIns="0" rIns="0" bIns="0" rtlCol="0">
+                <a:spAutoFit/>
+              </a:bodyPr>
+              <a:lstStyle/>
+              <a:p>
+                <a:pPr algn="ctr"/>
+                <a:r>
+                  <a:rPr kumimoji="1" lang="ja-JP" altLang="en-US" sz="1100" dirty="0">
+                    <a:latin typeface="Cambria Math" panose="02040503050406030204" pitchFamily="18" charset="0"/>
+                    <a:ea typeface="Cambria Math" panose="02040503050406030204" pitchFamily="18" charset="0"/>
+                  </a:rPr>
+                  <a:t>ページサイズ</a:t>
+                </a:r>
+                <a:r>
+                  <a:rPr kumimoji="1" lang="en-US" altLang="ja-JP" sz="1100" dirty="0">
+                    <a:latin typeface="Cambria Math" panose="02040503050406030204" pitchFamily="18" charset="0"/>
+                    <a:ea typeface="Cambria Math" panose="02040503050406030204" pitchFamily="18" charset="0"/>
+                  </a:rPr>
+                  <a:t>[byte]</a:t>
+                </a:r>
+                <a:endParaRPr kumimoji="1" lang="ja-JP" altLang="en-US" sz="1100" dirty="0">
+                  <a:latin typeface="Cambria Math" panose="02040503050406030204" pitchFamily="18" charset="0"/>
+                </a:endParaRPr>
+              </a:p>
+            </p:txBody>
+          </p:sp>
+          <p:sp>
+            <p:nvSpPr>
+              <p:cNvPr id="9" name="テキスト ボックス 8">
+                <a:extLst>
+                  <a:ext uri="{FF2B5EF4-FFF2-40B4-BE49-F238E27FC236}">
+                    <a16:creationId xmlns:a16="http://schemas.microsoft.com/office/drawing/2014/main" id="{AD6BE0D8-3600-FAF2-4435-1F22723A7104}"/>
+                  </a:ext>
+                </a:extLst>
+              </p:cNvPr>
+              <p:cNvSpPr txBox="1"/>
+              <p:nvPr/>
+            </p:nvSpPr>
+            <p:spPr>
+              <a:xfrm rot="16200000">
+                <a:off x="-577796" y="462942"/>
+                <a:ext cx="1257548" cy="193282"/>
+              </a:xfrm>
+              <a:prstGeom prst="rect">
+                <a:avLst/>
+              </a:prstGeom>
+              <a:noFill/>
+            </p:spPr>
+            <p:txBody>
+              <a:bodyPr wrap="square" lIns="0" tIns="0" rIns="0" bIns="0" rtlCol="0">
+                <a:spAutoFit/>
+              </a:bodyPr>
+              <a:lstStyle/>
+              <a:p>
+                <a:pPr algn="ctr"/>
+                <a:r>
+                  <a:rPr kumimoji="1" lang="ja-JP" altLang="en-US" sz="1100" dirty="0">
+                    <a:latin typeface="Cambria Math" panose="02040503050406030204" pitchFamily="18" charset="0"/>
+                    <a:ea typeface="Cambria Math" panose="02040503050406030204" pitchFamily="18" charset="0"/>
+                  </a:rPr>
+                  <a:t>スループット</a:t>
+                </a:r>
+                <a:r>
+                  <a:rPr kumimoji="1" lang="en-US" altLang="ja-JP" sz="1100" dirty="0">
+                    <a:latin typeface="Cambria Math" panose="02040503050406030204" pitchFamily="18" charset="0"/>
+                    <a:ea typeface="Cambria Math" panose="02040503050406030204" pitchFamily="18" charset="0"/>
+                  </a:rPr>
+                  <a:t> [</a:t>
+                </a:r>
+                <a:r>
+                  <a:rPr kumimoji="1" lang="en-US" altLang="ja-JP" sz="1100" dirty="0" err="1">
+                    <a:latin typeface="Cambria Math" panose="02040503050406030204" pitchFamily="18" charset="0"/>
+                    <a:ea typeface="Cambria Math" panose="02040503050406030204" pitchFamily="18" charset="0"/>
+                  </a:rPr>
+                  <a:t>MRec</a:t>
+                </a:r>
+                <a:r>
+                  <a:rPr kumimoji="1" lang="en-US" altLang="ja-JP" sz="1100" dirty="0">
+                    <a:latin typeface="Cambria Math" panose="02040503050406030204" pitchFamily="18" charset="0"/>
+                    <a:ea typeface="Cambria Math" panose="02040503050406030204" pitchFamily="18" charset="0"/>
+                  </a:rPr>
+                  <a:t>/s]</a:t>
+                </a:r>
+                <a:endParaRPr kumimoji="1" lang="ja-JP" altLang="en-US" sz="1100" dirty="0">
+                  <a:latin typeface="Cambria Math" panose="02040503050406030204" pitchFamily="18" charset="0"/>
+                </a:endParaRPr>
+              </a:p>
+            </p:txBody>
+          </p:sp>
+        </p:grpSp>
+        <p:grpSp>
+          <p:nvGrpSpPr>
+            <p:cNvPr id="10" name="グループ化 9">
               <a:extLst>
                 <a:ext uri="{FF2B5EF4-FFF2-40B4-BE49-F238E27FC236}">
-                  <a16:creationId xmlns:a16="http://schemas.microsoft.com/office/drawing/2014/main" id="{EF4DFC79-4932-E3FF-DBEE-140BAB665251}"/>
+                  <a16:creationId xmlns:a16="http://schemas.microsoft.com/office/drawing/2014/main" id="{753F8B70-6A27-4DFD-C71D-91B812B33CAD}"/>
                 </a:ext>
               </a:extLst>
             </p:cNvPr>
-            <p:cNvSpPr txBox="1"/>
+            <p:cNvGrpSpPr/>
             <p:nvPr/>
-          </p:nvSpPr>
-          <p:spPr>
+          </p:nvGrpSpPr>
+          <p:grpSpPr>
             <a:xfrm>
-              <a:off x="333022" y="1058532"/>
-              <a:ext cx="2333480" cy="110039"/>
+              <a:off x="2831857" y="277"/>
+              <a:ext cx="3032060" cy="2111400"/>
+              <a:chOff x="-40979" y="-16654"/>
+              <a:chExt cx="2993727" cy="1212257"/>
             </a:xfrm>
-            <a:prstGeom prst="rect">
-              <a:avLst/>
-            </a:prstGeom>
-            <a:noFill/>
-          </p:spPr>
-          <p:txBody>
-            <a:bodyPr wrap="square" lIns="0" tIns="0" rIns="0" bIns="0" rtlCol="0">
-              <a:spAutoFit/>
-            </a:bodyPr>
-            <a:lstStyle/>
-            <a:p>
-              <a:pPr algn="ctr"/>
-              <a:r>
-                <a:rPr kumimoji="1" lang="ja-JP" altLang="en-US" sz="1100" dirty="0">
+          </p:grpSpPr>
+          <p:graphicFrame>
+            <p:nvGraphicFramePr>
+              <p:cNvPr id="11" name="グラフ 10">
+                <a:extLst>
+                  <a:ext uri="{FF2B5EF4-FFF2-40B4-BE49-F238E27FC236}">
+                    <a16:creationId xmlns:a16="http://schemas.microsoft.com/office/drawing/2014/main" id="{E1E6F937-EDBE-FC98-F7C5-8CB942AD7A7F}"/>
+                  </a:ext>
+                </a:extLst>
+              </p:cNvPr>
+              <p:cNvGraphicFramePr/>
+              <p:nvPr>
+                <p:extLst>
+                  <p:ext uri="{D42A27DB-BD31-4B8C-83A1-F6EECF244321}">
+                    <p14:modId xmlns:p14="http://schemas.microsoft.com/office/powerpoint/2010/main" val="1646345370"/>
+                  </p:ext>
+                </p:extLst>
+              </p:nvPr>
+            </p:nvGraphicFramePr>
+            <p:xfrm>
+              <a:off x="171572" y="-16649"/>
+              <a:ext cx="2781176" cy="1212252"/>
+            </p:xfrm>
+            <a:graphic>
+              <a:graphicData uri="http://schemas.openxmlformats.org/drawingml/2006/chart">
+                <c:chart xmlns:c="http://schemas.openxmlformats.org/drawingml/2006/chart" xmlns:r="http://schemas.openxmlformats.org/officeDocument/2006/relationships" r:id="rId3"/>
+              </a:graphicData>
+            </a:graphic>
+          </p:graphicFrame>
+          <p:sp>
+            <p:nvSpPr>
+              <p:cNvPr id="12" name="テキスト ボックス 11">
+                <a:extLst>
+                  <a:ext uri="{FF2B5EF4-FFF2-40B4-BE49-F238E27FC236}">
+                    <a16:creationId xmlns:a16="http://schemas.microsoft.com/office/drawing/2014/main" id="{6FB4CD9D-817E-EADE-5962-70564320DD0D}"/>
+                  </a:ext>
+                </a:extLst>
+              </p:cNvPr>
+              <p:cNvSpPr txBox="1"/>
+              <p:nvPr/>
+            </p:nvSpPr>
+            <p:spPr>
+              <a:xfrm>
+                <a:off x="234973" y="1070454"/>
+                <a:ext cx="2475120" cy="100796"/>
+              </a:xfrm>
+              <a:prstGeom prst="rect">
+                <a:avLst/>
+              </a:prstGeom>
+              <a:noFill/>
+            </p:spPr>
+            <p:txBody>
+              <a:bodyPr wrap="square" lIns="0" tIns="0" rIns="0" bIns="0" rtlCol="0">
+                <a:spAutoFit/>
+              </a:bodyPr>
+              <a:lstStyle/>
+              <a:p>
+                <a:pPr algn="ctr"/>
+                <a:r>
+                  <a:rPr kumimoji="1" lang="ja-JP" altLang="en-US" sz="1100" dirty="0">
+                    <a:latin typeface="Cambria Math" panose="02040503050406030204" pitchFamily="18" charset="0"/>
+                    <a:ea typeface="Cambria Math" panose="02040503050406030204" pitchFamily="18" charset="0"/>
+                  </a:rPr>
+                  <a:t>ページサイズ</a:t>
+                </a:r>
+                <a:r>
+                  <a:rPr kumimoji="1" lang="en-US" altLang="ja-JP" sz="1100" dirty="0">
+                    <a:latin typeface="Cambria Math" panose="02040503050406030204" pitchFamily="18" charset="0"/>
+                    <a:ea typeface="Cambria Math" panose="02040503050406030204" pitchFamily="18" charset="0"/>
+                  </a:rPr>
+                  <a:t>[byte]</a:t>
+                </a:r>
+                <a:endParaRPr kumimoji="1" lang="ja-JP" altLang="en-US" sz="1100" dirty="0">
                   <a:latin typeface="Cambria Math" panose="02040503050406030204" pitchFamily="18" charset="0"/>
-                  <a:ea typeface="Cambria Math" panose="02040503050406030204" pitchFamily="18" charset="0"/>
-                </a:rPr>
-                <a:t>ページサイズ</a:t>
-              </a:r>
-              <a:r>
-                <a:rPr kumimoji="1" lang="en-US" altLang="ja-JP" sz="1100" dirty="0">
+                </a:endParaRPr>
+              </a:p>
+            </p:txBody>
+          </p:sp>
+          <p:sp>
+            <p:nvSpPr>
+              <p:cNvPr id="13" name="テキスト ボックス 12">
+                <a:extLst>
+                  <a:ext uri="{FF2B5EF4-FFF2-40B4-BE49-F238E27FC236}">
+                    <a16:creationId xmlns:a16="http://schemas.microsoft.com/office/drawing/2014/main" id="{4707F06C-9622-44FE-1171-85E0C6E02082}"/>
+                  </a:ext>
+                </a:extLst>
+              </p:cNvPr>
+              <p:cNvSpPr txBox="1"/>
+              <p:nvPr/>
+            </p:nvSpPr>
+            <p:spPr>
+              <a:xfrm rot="16200000">
+                <a:off x="-555878" y="498245"/>
+                <a:ext cx="1212255" cy="182458"/>
+              </a:xfrm>
+              <a:prstGeom prst="rect">
+                <a:avLst/>
+              </a:prstGeom>
+              <a:noFill/>
+            </p:spPr>
+            <p:txBody>
+              <a:bodyPr wrap="square" lIns="0" tIns="0" rIns="0" bIns="0" rtlCol="0">
+                <a:spAutoFit/>
+              </a:bodyPr>
+              <a:lstStyle/>
+              <a:p>
+                <a:pPr algn="ctr"/>
+                <a:r>
+                  <a:rPr kumimoji="1" lang="ja-JP" altLang="en-US" sz="1100" dirty="0">
+                    <a:latin typeface="Cambria Math" panose="02040503050406030204" pitchFamily="18" charset="0"/>
+                    <a:ea typeface="Cambria Math" panose="02040503050406030204" pitchFamily="18" charset="0"/>
+                  </a:rPr>
+                  <a:t>スループット</a:t>
+                </a:r>
+                <a:r>
+                  <a:rPr kumimoji="1" lang="en-US" altLang="ja-JP" sz="1100" dirty="0">
+                    <a:latin typeface="Cambria Math" panose="02040503050406030204" pitchFamily="18" charset="0"/>
+                    <a:ea typeface="Cambria Math" panose="02040503050406030204" pitchFamily="18" charset="0"/>
+                  </a:rPr>
+                  <a:t> [</a:t>
+                </a:r>
+                <a:r>
+                  <a:rPr kumimoji="1" lang="en-US" altLang="ja-JP" sz="1100" dirty="0" err="1">
+                    <a:latin typeface="Cambria Math" panose="02040503050406030204" pitchFamily="18" charset="0"/>
+                    <a:ea typeface="Cambria Math" panose="02040503050406030204" pitchFamily="18" charset="0"/>
+                  </a:rPr>
+                  <a:t>MRec</a:t>
+                </a:r>
+                <a:r>
+                  <a:rPr kumimoji="1" lang="en-US" altLang="ja-JP" sz="1100" dirty="0">
+                    <a:latin typeface="Cambria Math" panose="02040503050406030204" pitchFamily="18" charset="0"/>
+                    <a:ea typeface="Cambria Math" panose="02040503050406030204" pitchFamily="18" charset="0"/>
+                  </a:rPr>
+                  <a:t>/s]</a:t>
+                </a:r>
+                <a:endParaRPr kumimoji="1" lang="ja-JP" altLang="en-US" sz="1100" dirty="0">
                   <a:latin typeface="Cambria Math" panose="02040503050406030204" pitchFamily="18" charset="0"/>
-                  <a:ea typeface="Cambria Math" panose="02040503050406030204" pitchFamily="18" charset="0"/>
-                </a:rPr>
-                <a:t>[byte]</a:t>
-              </a:r>
-              <a:endParaRPr kumimoji="1" lang="ja-JP" altLang="en-US" sz="1100" dirty="0">
-                <a:latin typeface="Cambria Math" panose="02040503050406030204" pitchFamily="18" charset="0"/>
-              </a:endParaRPr>
-            </a:p>
-          </p:txBody>
-        </p:sp>
-        <p:sp>
-          <p:nvSpPr>
-            <p:cNvPr id="9" name="テキスト ボックス 8">
-              <a:extLst>
-                <a:ext uri="{FF2B5EF4-FFF2-40B4-BE49-F238E27FC236}">
-                  <a16:creationId xmlns:a16="http://schemas.microsoft.com/office/drawing/2014/main" id="{AD6BE0D8-3600-FAF2-4435-1F22723A7104}"/>
-                </a:ext>
-              </a:extLst>
-            </p:cNvPr>
-            <p:cNvSpPr txBox="1"/>
-            <p:nvPr/>
-          </p:nvSpPr>
-          <p:spPr>
-            <a:xfrm rot="16200000">
-              <a:off x="-577796" y="462963"/>
-              <a:ext cx="1257548" cy="193239"/>
-            </a:xfrm>
-            <a:prstGeom prst="rect">
-              <a:avLst/>
-            </a:prstGeom>
-            <a:noFill/>
-          </p:spPr>
-          <p:txBody>
-            <a:bodyPr wrap="square" lIns="0" tIns="0" rIns="0" bIns="0" rtlCol="0">
-              <a:spAutoFit/>
-            </a:bodyPr>
-            <a:lstStyle/>
-            <a:p>
-              <a:pPr algn="ctr"/>
-              <a:r>
-                <a:rPr kumimoji="1" lang="ja-JP" altLang="en-US" sz="1100" dirty="0">
-                  <a:latin typeface="Cambria Math" panose="02040503050406030204" pitchFamily="18" charset="0"/>
-                  <a:ea typeface="Cambria Math" panose="02040503050406030204" pitchFamily="18" charset="0"/>
-                </a:rPr>
-                <a:t>スループット</a:t>
-              </a:r>
-              <a:r>
-                <a:rPr kumimoji="1" lang="en-US" altLang="ja-JP" sz="1100" dirty="0">
-                  <a:latin typeface="Cambria Math" panose="02040503050406030204" pitchFamily="18" charset="0"/>
-                  <a:ea typeface="Cambria Math" panose="02040503050406030204" pitchFamily="18" charset="0"/>
-                </a:rPr>
-                <a:t> [</a:t>
-              </a:r>
-              <a:r>
-                <a:rPr kumimoji="1" lang="en-US" altLang="ja-JP" sz="1100" dirty="0" err="1">
-                  <a:latin typeface="Cambria Math" panose="02040503050406030204" pitchFamily="18" charset="0"/>
-                  <a:ea typeface="Cambria Math" panose="02040503050406030204" pitchFamily="18" charset="0"/>
-                </a:rPr>
-                <a:t>MRec</a:t>
-              </a:r>
-              <a:r>
-                <a:rPr kumimoji="1" lang="en-US" altLang="ja-JP" sz="1100" dirty="0">
-                  <a:latin typeface="Cambria Math" panose="02040503050406030204" pitchFamily="18" charset="0"/>
-                  <a:ea typeface="Cambria Math" panose="02040503050406030204" pitchFamily="18" charset="0"/>
-                </a:rPr>
-                <a:t>/s]</a:t>
-              </a:r>
-              <a:endParaRPr kumimoji="1" lang="ja-JP" altLang="en-US" sz="1100" dirty="0">
-                <a:latin typeface="Cambria Math" panose="02040503050406030204" pitchFamily="18" charset="0"/>
-              </a:endParaRPr>
-            </a:p>
-          </p:txBody>
-        </p:sp>
+                </a:endParaRPr>
+              </a:p>
+            </p:txBody>
+          </p:sp>
+        </p:grpSp>
       </p:grpSp>
-      <p:grpSp>
-        <p:nvGrpSpPr>
-          <p:cNvPr id="10" name="グループ化 9">
+      <p:sp>
+        <p:nvSpPr>
+          <p:cNvPr id="4" name="テキスト ボックス 3">
             <a:extLst>
               <a:ext uri="{FF2B5EF4-FFF2-40B4-BE49-F238E27FC236}">
-                <a16:creationId xmlns:a16="http://schemas.microsoft.com/office/drawing/2014/main" id="{753F8B70-6A27-4DFD-C71D-91B812B33CAD}"/>
+                <a16:creationId xmlns:a16="http://schemas.microsoft.com/office/drawing/2014/main" id="{ACA5ED9D-FF5E-FDDE-54E5-70E3CF24ABBC}"/>
               </a:ext>
             </a:extLst>
           </p:cNvPr>
-          <p:cNvGrpSpPr/>
+          <p:cNvSpPr txBox="1"/>
           <p:nvPr/>
-        </p:nvGrpSpPr>
-        <p:grpSpPr>
+        </p:nvSpPr>
+        <p:spPr>
           <a:xfrm>
-            <a:off x="2622606" y="0"/>
-            <a:ext cx="2778069" cy="1934543"/>
-            <a:chOff x="-40958" y="-16654"/>
-            <a:chExt cx="2993706" cy="1212256"/>
+            <a:off x="2858378" y="1973181"/>
+            <a:ext cx="2308777" cy="169277"/>
           </a:xfrm>
-        </p:grpSpPr>
-        <p:graphicFrame>
-          <p:nvGraphicFramePr>
-            <p:cNvPr id="11" name="グラフ 10">
-              <a:extLst>
-                <a:ext uri="{FF2B5EF4-FFF2-40B4-BE49-F238E27FC236}">
-                  <a16:creationId xmlns:a16="http://schemas.microsoft.com/office/drawing/2014/main" id="{E1E6F937-EDBE-FC98-F7C5-8CB942AD7A7F}"/>
-                </a:ext>
-              </a:extLst>
-            </p:cNvPr>
-            <p:cNvGraphicFramePr/>
-            <p:nvPr>
-              <p:extLst>
-                <p:ext uri="{D42A27DB-BD31-4B8C-83A1-F6EECF244321}">
-                  <p14:modId xmlns:p14="http://schemas.microsoft.com/office/powerpoint/2010/main" val="2071890536"/>
-                </p:ext>
-              </p:extLst>
-            </p:nvPr>
-          </p:nvGraphicFramePr>
-          <p:xfrm>
-            <a:off x="171572" y="-16650"/>
-            <a:ext cx="2781176" cy="1212252"/>
-          </p:xfrm>
-          <a:graphic>
-            <a:graphicData uri="http://schemas.openxmlformats.org/drawingml/2006/chart">
-              <c:chart xmlns:c="http://schemas.openxmlformats.org/drawingml/2006/chart" xmlns:r="http://schemas.openxmlformats.org/officeDocument/2006/relationships" r:id="rId3"/>
-            </a:graphicData>
-          </a:graphic>
-        </p:graphicFrame>
-        <p:sp>
-          <p:nvSpPr>
-            <p:cNvPr id="12" name="テキスト ボックス 11">
-              <a:extLst>
-                <a:ext uri="{FF2B5EF4-FFF2-40B4-BE49-F238E27FC236}">
-                  <a16:creationId xmlns:a16="http://schemas.microsoft.com/office/drawing/2014/main" id="{6FB4CD9D-817E-EADE-5962-70564320DD0D}"/>
-                </a:ext>
-              </a:extLst>
-            </p:cNvPr>
-            <p:cNvSpPr txBox="1"/>
-            <p:nvPr/>
-          </p:nvSpPr>
-          <p:spPr>
-            <a:xfrm>
-              <a:off x="234973" y="1070454"/>
-              <a:ext cx="2475120" cy="106075"/>
-            </a:xfrm>
-            <a:prstGeom prst="rect">
-              <a:avLst/>
-            </a:prstGeom>
-            <a:noFill/>
-          </p:spPr>
-          <p:txBody>
-            <a:bodyPr wrap="square" lIns="0" tIns="0" rIns="0" bIns="0" rtlCol="0">
-              <a:spAutoFit/>
-            </a:bodyPr>
-            <a:lstStyle/>
-            <a:p>
-              <a:pPr algn="ctr"/>
-              <a:r>
-                <a:rPr kumimoji="1" lang="ja-JP" altLang="en-US" sz="1100" dirty="0">
-                  <a:latin typeface="Cambria Math" panose="02040503050406030204" pitchFamily="18" charset="0"/>
-                  <a:ea typeface="Cambria Math" panose="02040503050406030204" pitchFamily="18" charset="0"/>
-                </a:rPr>
-                <a:t>ページサイズ</a:t>
-              </a:r>
-              <a:r>
-                <a:rPr kumimoji="1" lang="en-US" altLang="ja-JP" sz="1100" dirty="0">
-                  <a:latin typeface="Cambria Math" panose="02040503050406030204" pitchFamily="18" charset="0"/>
-                  <a:ea typeface="Cambria Math" panose="02040503050406030204" pitchFamily="18" charset="0"/>
-                </a:rPr>
-                <a:t>[byte]</a:t>
-              </a:r>
-              <a:endParaRPr kumimoji="1" lang="ja-JP" altLang="en-US" sz="1100" dirty="0">
+          <a:prstGeom prst="rect">
+            <a:avLst/>
+          </a:prstGeom>
+          <a:noFill/>
+        </p:spPr>
+        <p:txBody>
+          <a:bodyPr wrap="square" lIns="0" tIns="0" rIns="0" bIns="0" rtlCol="0">
+            <a:spAutoFit/>
+          </a:bodyPr>
+          <a:lstStyle/>
+          <a:p>
+            <a:pPr algn="ctr"/>
+            <a:r>
+              <a:rPr kumimoji="1" lang="ja-JP" altLang="en-US" sz="1100" dirty="0">
                 <a:latin typeface="Cambria Math" panose="02040503050406030204" pitchFamily="18" charset="0"/>
-              </a:endParaRPr>
-            </a:p>
-          </p:txBody>
-        </p:sp>
-        <p:sp>
-          <p:nvSpPr>
-            <p:cNvPr id="13" name="テキスト ボックス 12">
-              <a:extLst>
-                <a:ext uri="{FF2B5EF4-FFF2-40B4-BE49-F238E27FC236}">
-                  <a16:creationId xmlns:a16="http://schemas.microsoft.com/office/drawing/2014/main" id="{4707F06C-9622-44FE-1171-85E0C6E02082}"/>
-                </a:ext>
-              </a:extLst>
-            </p:cNvPr>
-            <p:cNvSpPr txBox="1"/>
-            <p:nvPr/>
-          </p:nvSpPr>
-          <p:spPr>
-            <a:xfrm rot="16200000">
-              <a:off x="-555878" y="498266"/>
-              <a:ext cx="1212255" cy="182416"/>
-            </a:xfrm>
-            <a:prstGeom prst="rect">
-              <a:avLst/>
-            </a:prstGeom>
-            <a:noFill/>
-          </p:spPr>
-          <p:txBody>
-            <a:bodyPr wrap="square" lIns="0" tIns="0" rIns="0" bIns="0" rtlCol="0">
-              <a:spAutoFit/>
-            </a:bodyPr>
-            <a:lstStyle/>
-            <a:p>
-              <a:pPr algn="ctr"/>
-              <a:r>
-                <a:rPr kumimoji="1" lang="ja-JP" altLang="en-US" sz="1100" dirty="0">
-                  <a:latin typeface="Cambria Math" panose="02040503050406030204" pitchFamily="18" charset="0"/>
-                  <a:ea typeface="Cambria Math" panose="02040503050406030204" pitchFamily="18" charset="0"/>
-                </a:rPr>
-                <a:t>スループット</a:t>
-              </a:r>
-              <a:r>
-                <a:rPr kumimoji="1" lang="en-US" altLang="ja-JP" sz="1100" dirty="0">
-                  <a:latin typeface="Cambria Math" panose="02040503050406030204" pitchFamily="18" charset="0"/>
-                  <a:ea typeface="Cambria Math" panose="02040503050406030204" pitchFamily="18" charset="0"/>
-                </a:rPr>
-                <a:t> [</a:t>
-              </a:r>
-              <a:r>
-                <a:rPr kumimoji="1" lang="en-US" altLang="ja-JP" sz="1100" dirty="0" err="1">
-                  <a:latin typeface="Cambria Math" panose="02040503050406030204" pitchFamily="18" charset="0"/>
-                  <a:ea typeface="Cambria Math" panose="02040503050406030204" pitchFamily="18" charset="0"/>
-                </a:rPr>
-                <a:t>MRec</a:t>
-              </a:r>
-              <a:r>
-                <a:rPr kumimoji="1" lang="en-US" altLang="ja-JP" sz="1100" dirty="0">
-                  <a:latin typeface="Cambria Math" panose="02040503050406030204" pitchFamily="18" charset="0"/>
-                  <a:ea typeface="Cambria Math" panose="02040503050406030204" pitchFamily="18" charset="0"/>
-                </a:rPr>
-                <a:t>/s]</a:t>
-              </a:r>
-              <a:endParaRPr kumimoji="1" lang="ja-JP" altLang="en-US" sz="1100" dirty="0">
+                <a:ea typeface="Cambria Math" panose="02040503050406030204" pitchFamily="18" charset="0"/>
+              </a:rPr>
+              <a:t>範囲検索</a:t>
+            </a:r>
+            <a:endParaRPr kumimoji="1" lang="ja-JP" altLang="en-US" sz="1100" dirty="0">
+              <a:latin typeface="Cambria Math" panose="02040503050406030204" pitchFamily="18" charset="0"/>
+            </a:endParaRPr>
+          </a:p>
+        </p:txBody>
+      </p:sp>
+      <p:sp>
+        <p:nvSpPr>
+          <p:cNvPr id="5" name="テキスト ボックス 4">
+            <a:extLst>
+              <a:ext uri="{FF2B5EF4-FFF2-40B4-BE49-F238E27FC236}">
+                <a16:creationId xmlns:a16="http://schemas.microsoft.com/office/drawing/2014/main" id="{3D250092-10F4-58E2-1134-8032E5CA700E}"/>
+              </a:ext>
+            </a:extLst>
+          </p:cNvPr>
+          <p:cNvSpPr txBox="1"/>
+          <p:nvPr/>
+        </p:nvSpPr>
+        <p:spPr>
+          <a:xfrm>
+            <a:off x="360292" y="1958022"/>
+            <a:ext cx="1894666" cy="169277"/>
+          </a:xfrm>
+          <a:prstGeom prst="rect">
+            <a:avLst/>
+          </a:prstGeom>
+          <a:noFill/>
+        </p:spPr>
+        <p:txBody>
+          <a:bodyPr wrap="square" lIns="0" tIns="0" rIns="0" bIns="0" rtlCol="0">
+            <a:spAutoFit/>
+          </a:bodyPr>
+          <a:lstStyle/>
+          <a:p>
+            <a:pPr algn="ctr"/>
+            <a:r>
+              <a:rPr kumimoji="1" lang="ja-JP" altLang="en-US" sz="1100" dirty="0">
                 <a:latin typeface="Cambria Math" panose="02040503050406030204" pitchFamily="18" charset="0"/>
-              </a:endParaRPr>
-            </a:p>
-          </p:txBody>
-        </p:sp>
-      </p:grpSp>
+                <a:ea typeface="Cambria Math" panose="02040503050406030204" pitchFamily="18" charset="0"/>
+              </a:rPr>
+              <a:t>挿入</a:t>
+            </a:r>
+            <a:endParaRPr kumimoji="1" lang="ja-JP" altLang="en-US" sz="1100" dirty="0">
+              <a:latin typeface="Cambria Math" panose="02040503050406030204" pitchFamily="18" charset="0"/>
+            </a:endParaRPr>
+          </a:p>
+        </p:txBody>
+      </p:sp>
     </p:spTree>
     <p:extLst>
       <p:ext uri="{BB962C8B-B14F-4D97-AF65-F5344CB8AC3E}">

</xml_diff>